<commit_message>
Update: fixed aliasing at focal plane for HHLM+HRM
</commit_message>
<xml_diff>
--- a/03-10-21_Meeting.pptx
+++ b/03-10-21_Meeting.pptx
@@ -5,7 +5,7 @@
     <p:sldMasterId id="2147483648" r:id="rId1"/>
   </p:sldMasterIdLst>
   <p:notesMasterIdLst>
-    <p:notesMasterId r:id="rId14"/>
+    <p:notesMasterId r:id="rId15"/>
   </p:notesMasterIdLst>
   <p:sldIdLst>
     <p:sldId id="256" r:id="rId2"/>
@@ -16,10 +16,11 @@
     <p:sldId id="261" r:id="rId7"/>
     <p:sldId id="262" r:id="rId8"/>
     <p:sldId id="264" r:id="rId9"/>
-    <p:sldId id="267" r:id="rId10"/>
-    <p:sldId id="265" r:id="rId11"/>
-    <p:sldId id="266" r:id="rId12"/>
-    <p:sldId id="268" r:id="rId13"/>
+    <p:sldId id="270" r:id="rId10"/>
+    <p:sldId id="271" r:id="rId11"/>
+    <p:sldId id="272" r:id="rId12"/>
+    <p:sldId id="273" r:id="rId13"/>
+    <p:sldId id="274" r:id="rId14"/>
   </p:sldIdLst>
   <p:sldSz cx="12192000" cy="6858000"/>
   <p:notesSz cx="6858000" cy="9144000"/>
@@ -118,6 +119,11 @@
       </a:defRPr>
     </a:lvl9pPr>
   </p:defaultTextStyle>
+  <p:extLst>
+    <p:ext uri="{EFAFB233-063F-42B5-8137-9DF3F51BA10A}">
+      <p15:sldGuideLst xmlns:p15="http://schemas.microsoft.com/office/powerpoint/2012/main"/>
+    </p:ext>
+  </p:extLst>
 </p:presentation>
 </file>
 
@@ -203,7 +209,7 @@
           <a:p>
             <a:fld id="{1C752C55-AC90-49B3-A8E7-79F0E9CD09D0}" type="datetimeFigureOut">
               <a:rPr lang="zh-CN" altLang="en-US" smtClean="0"/>
-              <a:t>2021/3/10</a:t>
+              <a:t>2021/3/11</a:t>
             </a:fld>
             <a:endParaRPr lang="zh-CN" altLang="en-US"/>
           </a:p>
@@ -535,7 +541,7 @@
           <a:p>
             <a:fld id="{261C19CE-3C73-4AA3-8037-F84507423579}" type="slidenum">
               <a:rPr lang="zh-CN" altLang="en-US" smtClean="0"/>
-              <a:t>10</a:t>
+              <a:t>11</a:t>
             </a:fld>
             <a:endParaRPr lang="zh-CN" altLang="en-US"/>
           </a:p>
@@ -544,91 +550,7 @@
     </p:spTree>
     <p:extLst>
       <p:ext uri="{BB962C8B-B14F-4D97-AF65-F5344CB8AC3E}">
-        <p14:creationId xmlns:p14="http://schemas.microsoft.com/office/powerpoint/2010/main" val="2833705615"/>
-      </p:ext>
-    </p:extLst>
-  </p:cSld>
-  <p:clrMapOvr>
-    <a:masterClrMapping/>
-  </p:clrMapOvr>
-</p:notes>
-</file>
-
-<file path=ppt/notesSlides/notesSlide2.xml><?xml version="1.0" encoding="utf-8"?>
-<p:notes xmlns:a="http://schemas.openxmlformats.org/drawingml/2006/main" xmlns:r="http://schemas.openxmlformats.org/officeDocument/2006/relationships" xmlns:p="http://schemas.openxmlformats.org/presentationml/2006/main">
-  <p:cSld>
-    <p:spTree>
-      <p:nvGrpSpPr>
-        <p:cNvPr id="1" name=""/>
-        <p:cNvGrpSpPr/>
-        <p:nvPr/>
-      </p:nvGrpSpPr>
-      <p:grpSpPr>
-        <a:xfrm>
-          <a:off x="0" y="0"/>
-          <a:ext cx="0" cy="0"/>
-          <a:chOff x="0" y="0"/>
-          <a:chExt cx="0" cy="0"/>
-        </a:xfrm>
-      </p:grpSpPr>
-      <p:sp>
-        <p:nvSpPr>
-          <p:cNvPr id="2" name="幻灯片图像占位符 1"/>
-          <p:cNvSpPr>
-            <a:spLocks noGrp="1" noRot="1" noChangeAspect="1"/>
-          </p:cNvSpPr>
-          <p:nvPr>
-            <p:ph type="sldImg"/>
-          </p:nvPr>
-        </p:nvSpPr>
-        <p:spPr/>
-      </p:sp>
-      <p:sp>
-        <p:nvSpPr>
-          <p:cNvPr id="3" name="备注占位符 2"/>
-          <p:cNvSpPr>
-            <a:spLocks noGrp="1"/>
-          </p:cNvSpPr>
-          <p:nvPr>
-            <p:ph type="body" idx="1"/>
-          </p:nvPr>
-        </p:nvSpPr>
-        <p:spPr/>
-        <p:txBody>
-          <a:bodyPr/>
-          <a:lstStyle/>
-          <a:p>
-            <a:endParaRPr lang="zh-CN" altLang="en-US" dirty="0"/>
-          </a:p>
-        </p:txBody>
-      </p:sp>
-      <p:sp>
-        <p:nvSpPr>
-          <p:cNvPr id="4" name="灯片编号占位符 3"/>
-          <p:cNvSpPr>
-            <a:spLocks noGrp="1"/>
-          </p:cNvSpPr>
-          <p:nvPr>
-            <p:ph type="sldNum" sz="quarter" idx="5"/>
-          </p:nvPr>
-        </p:nvSpPr>
-        <p:spPr/>
-        <p:txBody>
-          <a:bodyPr/>
-          <a:lstStyle/>
-          <a:p>
-            <a:fld id="{261C19CE-3C73-4AA3-8037-F84507423579}" type="slidenum">
-              <a:rPr lang="zh-CN" altLang="en-US" smtClean="0"/>
-              <a:t>12</a:t>
-            </a:fld>
-            <a:endParaRPr lang="zh-CN" altLang="en-US"/>
-          </a:p>
-        </p:txBody>
-      </p:sp>
-    </p:spTree>
-    <p:extLst>
-      <p:ext uri="{BB962C8B-B14F-4D97-AF65-F5344CB8AC3E}">
-        <p14:creationId xmlns:p14="http://schemas.microsoft.com/office/powerpoint/2010/main" val="4184545282"/>
+        <p14:creationId xmlns:p14="http://schemas.microsoft.com/office/powerpoint/2010/main" val="2543822447"/>
       </p:ext>
     </p:extLst>
   </p:cSld>
@@ -785,7 +707,7 @@
           <a:p>
             <a:fld id="{7473E25A-CDF2-4D66-AF33-52E3984607EF}" type="datetimeFigureOut">
               <a:rPr lang="zh-CN" altLang="en-US" smtClean="0"/>
-              <a:t>2021/3/10</a:t>
+              <a:t>2021/3/11</a:t>
             </a:fld>
             <a:endParaRPr lang="zh-CN" altLang="en-US"/>
           </a:p>
@@ -983,7 +905,7 @@
           <a:p>
             <a:fld id="{7473E25A-CDF2-4D66-AF33-52E3984607EF}" type="datetimeFigureOut">
               <a:rPr lang="zh-CN" altLang="en-US" smtClean="0"/>
-              <a:t>2021/3/10</a:t>
+              <a:t>2021/3/11</a:t>
             </a:fld>
             <a:endParaRPr lang="zh-CN" altLang="en-US"/>
           </a:p>
@@ -1191,7 +1113,7 @@
           <a:p>
             <a:fld id="{7473E25A-CDF2-4D66-AF33-52E3984607EF}" type="datetimeFigureOut">
               <a:rPr lang="zh-CN" altLang="en-US" smtClean="0"/>
-              <a:t>2021/3/10</a:t>
+              <a:t>2021/3/11</a:t>
             </a:fld>
             <a:endParaRPr lang="zh-CN" altLang="en-US"/>
           </a:p>
@@ -1389,7 +1311,7 @@
           <a:p>
             <a:fld id="{7473E25A-CDF2-4D66-AF33-52E3984607EF}" type="datetimeFigureOut">
               <a:rPr lang="zh-CN" altLang="en-US" smtClean="0"/>
-              <a:t>2021/3/10</a:t>
+              <a:t>2021/3/11</a:t>
             </a:fld>
             <a:endParaRPr lang="zh-CN" altLang="en-US"/>
           </a:p>
@@ -1664,7 +1586,7 @@
           <a:p>
             <a:fld id="{7473E25A-CDF2-4D66-AF33-52E3984607EF}" type="datetimeFigureOut">
               <a:rPr lang="zh-CN" altLang="en-US" smtClean="0"/>
-              <a:t>2021/3/10</a:t>
+              <a:t>2021/3/11</a:t>
             </a:fld>
             <a:endParaRPr lang="zh-CN" altLang="en-US"/>
           </a:p>
@@ -1929,7 +1851,7 @@
           <a:p>
             <a:fld id="{7473E25A-CDF2-4D66-AF33-52E3984607EF}" type="datetimeFigureOut">
               <a:rPr lang="zh-CN" altLang="en-US" smtClean="0"/>
-              <a:t>2021/3/10</a:t>
+              <a:t>2021/3/11</a:t>
             </a:fld>
             <a:endParaRPr lang="zh-CN" altLang="en-US"/>
           </a:p>
@@ -2341,7 +2263,7 @@
           <a:p>
             <a:fld id="{7473E25A-CDF2-4D66-AF33-52E3984607EF}" type="datetimeFigureOut">
               <a:rPr lang="zh-CN" altLang="en-US" smtClean="0"/>
-              <a:t>2021/3/10</a:t>
+              <a:t>2021/3/11</a:t>
             </a:fld>
             <a:endParaRPr lang="zh-CN" altLang="en-US"/>
           </a:p>
@@ -2482,7 +2404,7 @@
           <a:p>
             <a:fld id="{7473E25A-CDF2-4D66-AF33-52E3984607EF}" type="datetimeFigureOut">
               <a:rPr lang="zh-CN" altLang="en-US" smtClean="0"/>
-              <a:t>2021/3/10</a:t>
+              <a:t>2021/3/11</a:t>
             </a:fld>
             <a:endParaRPr lang="zh-CN" altLang="en-US"/>
           </a:p>
@@ -2595,7 +2517,7 @@
           <a:p>
             <a:fld id="{7473E25A-CDF2-4D66-AF33-52E3984607EF}" type="datetimeFigureOut">
               <a:rPr lang="zh-CN" altLang="en-US" smtClean="0"/>
-              <a:t>2021/3/10</a:t>
+              <a:t>2021/3/11</a:t>
             </a:fld>
             <a:endParaRPr lang="zh-CN" altLang="en-US"/>
           </a:p>
@@ -2906,7 +2828,7 @@
           <a:p>
             <a:fld id="{7473E25A-CDF2-4D66-AF33-52E3984607EF}" type="datetimeFigureOut">
               <a:rPr lang="zh-CN" altLang="en-US" smtClean="0"/>
-              <a:t>2021/3/10</a:t>
+              <a:t>2021/3/11</a:t>
             </a:fld>
             <a:endParaRPr lang="zh-CN" altLang="en-US"/>
           </a:p>
@@ -3194,7 +3116,7 @@
           <a:p>
             <a:fld id="{7473E25A-CDF2-4D66-AF33-52E3984607EF}" type="datetimeFigureOut">
               <a:rPr lang="zh-CN" altLang="en-US" smtClean="0"/>
-              <a:t>2021/3/10</a:t>
+              <a:t>2021/3/11</a:t>
             </a:fld>
             <a:endParaRPr lang="zh-CN" altLang="en-US"/>
           </a:p>
@@ -3435,7 +3357,7 @@
           <a:p>
             <a:fld id="{7473E25A-CDF2-4D66-AF33-52E3984607EF}" type="datetimeFigureOut">
               <a:rPr lang="zh-CN" altLang="en-US" smtClean="0"/>
-              <a:t>2021/3/10</a:t>
+              <a:t>2021/3/11</a:t>
             </a:fld>
             <a:endParaRPr lang="zh-CN" altLang="en-US"/>
           </a:p>
@@ -3904,7 +3826,7 @@
           <a:p>
             <a:r>
               <a:rPr lang="en-US" altLang="zh-CN" dirty="0"/>
-              <a:t>Nan Wang, Mar 10</a:t>
+              <a:t>Nan Wang, Mar 11</a:t>
             </a:r>
             <a:r>
               <a:rPr lang="en-US" altLang="zh-CN" baseline="30000" dirty="0"/>
@@ -3950,10 +3872,74 @@
       </p:grpSpPr>
       <p:pic>
         <p:nvPicPr>
-          <p:cNvPr id="9" name="图片 8">
-            <a:extLst>
-              <a:ext uri="{FF2B5EF4-FFF2-40B4-BE49-F238E27FC236}">
-                <a16:creationId xmlns:a16="http://schemas.microsoft.com/office/drawing/2014/main" id="{2D5BE4B2-5231-47E0-9131-6EFFCA414B58}"/>
+          <p:cNvPr id="7" name="图片 6">
+            <a:extLst>
+              <a:ext uri="{FF2B5EF4-FFF2-40B4-BE49-F238E27FC236}">
+                <a16:creationId xmlns:a16="http://schemas.microsoft.com/office/drawing/2014/main" id="{686862DF-EE77-4483-9D13-81543112ADDB}"/>
+              </a:ext>
+            </a:extLst>
+          </p:cNvPr>
+          <p:cNvPicPr>
+            <a:picLocks noChangeAspect="1"/>
+          </p:cNvPicPr>
+          <p:nvPr/>
+        </p:nvPicPr>
+        <p:blipFill>
+          <a:blip r:embed="rId2">
+            <a:extLst>
+              <a:ext uri="{28A0092B-C50C-407E-A947-70E740481C1C}">
+                <a14:useLocalDpi xmlns:a14="http://schemas.microsoft.com/office/drawing/2010/main" val="0"/>
+              </a:ext>
+            </a:extLst>
+          </a:blip>
+          <a:srcRect/>
+          <a:stretch/>
+        </p:blipFill>
+        <p:spPr>
+          <a:xfrm>
+            <a:off x="1210237" y="4663440"/>
+            <a:ext cx="10972800" cy="2194559"/>
+          </a:xfrm>
+          <a:prstGeom prst="rect">
+            <a:avLst/>
+          </a:prstGeom>
+        </p:spPr>
+      </p:pic>
+      <p:sp>
+        <p:nvSpPr>
+          <p:cNvPr id="2" name="标题 1">
+            <a:extLst>
+              <a:ext uri="{FF2B5EF4-FFF2-40B4-BE49-F238E27FC236}">
+                <a16:creationId xmlns:a16="http://schemas.microsoft.com/office/drawing/2014/main" id="{2A27C84F-93ED-439A-BF83-DB8FFBAE887B}"/>
+              </a:ext>
+            </a:extLst>
+          </p:cNvPr>
+          <p:cNvSpPr>
+            <a:spLocks noGrp="1"/>
+          </p:cNvSpPr>
+          <p:nvPr>
+            <p:ph type="title"/>
+          </p:nvPr>
+        </p:nvSpPr>
+        <p:spPr/>
+        <p:txBody>
+          <a:bodyPr/>
+          <a:lstStyle/>
+          <a:p>
+            <a:r>
+              <a:rPr lang="en-US" altLang="zh-CN" dirty="0"/>
+              <a:t>Getting rid of aliasing cont’d</a:t>
+            </a:r>
+            <a:endParaRPr lang="zh-CN" altLang="en-US" dirty="0"/>
+          </a:p>
+        </p:txBody>
+      </p:sp>
+      <p:pic>
+        <p:nvPicPr>
+          <p:cNvPr id="4" name="图片 3">
+            <a:extLst>
+              <a:ext uri="{FF2B5EF4-FFF2-40B4-BE49-F238E27FC236}">
+                <a16:creationId xmlns:a16="http://schemas.microsoft.com/office/drawing/2014/main" id="{FAA3956F-7077-4A1E-918D-765B5FAE1509}"/>
               </a:ext>
             </a:extLst>
           </p:cNvPr>
@@ -3975,8 +3961,8 @@
         </p:blipFill>
         <p:spPr>
           <a:xfrm>
-            <a:off x="609602" y="2331720"/>
-            <a:ext cx="10972795" cy="2194558"/>
+            <a:off x="1210239" y="2331720"/>
+            <a:ext cx="10972790" cy="2194558"/>
           </a:xfrm>
           <a:prstGeom prst="rect">
             <a:avLst/>
@@ -3985,55 +3971,10 @@
       </p:pic>
       <p:sp>
         <p:nvSpPr>
-          <p:cNvPr id="2" name="标题 1">
-            <a:extLst>
-              <a:ext uri="{FF2B5EF4-FFF2-40B4-BE49-F238E27FC236}">
-                <a16:creationId xmlns:a16="http://schemas.microsoft.com/office/drawing/2014/main" id="{A6839868-4208-486A-9D76-CAEDAAB8F472}"/>
-              </a:ext>
-            </a:extLst>
-          </p:cNvPr>
-          <p:cNvSpPr>
-            <a:spLocks noGrp="1"/>
-          </p:cNvSpPr>
-          <p:nvPr>
-            <p:ph type="title"/>
-          </p:nvPr>
-        </p:nvSpPr>
-        <p:spPr/>
-        <p:txBody>
-          <a:bodyPr/>
-          <a:lstStyle/>
-          <a:p>
-            <a:r>
-              <a:rPr lang="en-US" altLang="zh-CN" strike="sngStrike" dirty="0"/>
-              <a:t>400</a:t>
-            </a:r>
-            <a:r>
-              <a:rPr lang="en-US" altLang="zh-CN" dirty="0"/>
-              <a:t> </a:t>
-            </a:r>
-            <a:r>
-              <a:rPr lang="en-US" altLang="zh-CN" dirty="0">
-                <a:solidFill>
-                  <a:srgbClr val="FF0000"/>
-                </a:solidFill>
-              </a:rPr>
-              <a:t>100fs</a:t>
-            </a:r>
-            <a:r>
-              <a:rPr lang="en-US" altLang="zh-CN" dirty="0"/>
-              <a:t> incident beam comparison</a:t>
-            </a:r>
-            <a:endParaRPr lang="zh-CN" altLang="en-US" dirty="0"/>
-          </a:p>
-        </p:txBody>
-      </p:sp>
-      <p:sp>
-        <p:nvSpPr>
-          <p:cNvPr id="7" name="文本框 6">
-            <a:extLst>
-              <a:ext uri="{FF2B5EF4-FFF2-40B4-BE49-F238E27FC236}">
-                <a16:creationId xmlns:a16="http://schemas.microsoft.com/office/drawing/2014/main" id="{DC06195B-C19F-4F31-8D4B-A4A5CBF9A3E7}"/>
+          <p:cNvPr id="5" name="文本框 4">
+            <a:extLst>
+              <a:ext uri="{FF2B5EF4-FFF2-40B4-BE49-F238E27FC236}">
+                <a16:creationId xmlns:a16="http://schemas.microsoft.com/office/drawing/2014/main" id="{93E6867C-441A-441C-83B5-E16FE2672A67}"/>
               </a:ext>
             </a:extLst>
           </p:cNvPr>
@@ -4042,8 +3983,8 @@
         </p:nvSpPr>
         <p:spPr>
           <a:xfrm>
-            <a:off x="609602" y="3244333"/>
-            <a:ext cx="833883" cy="369332"/>
+            <a:off x="271590" y="2510133"/>
+            <a:ext cx="2695728" cy="3416320"/>
           </a:xfrm>
           <a:prstGeom prst="rect">
             <a:avLst/>
@@ -4051,110 +3992,67 @@
           <a:noFill/>
         </p:spPr>
         <p:txBody>
-          <a:bodyPr wrap="none" rtlCol="0">
+          <a:bodyPr wrap="square" rtlCol="0">
             <a:spAutoFit/>
           </a:bodyPr>
           <a:lstStyle/>
           <a:p>
             <a:r>
-              <a:rPr lang="en-US" altLang="zh-CN" dirty="0">
-                <a:solidFill>
-                  <a:srgbClr val="FF0000"/>
-                </a:solidFill>
-              </a:rPr>
-              <a:t>before</a:t>
-            </a:r>
-            <a:endParaRPr lang="zh-CN" altLang="en-US" dirty="0">
-              <a:solidFill>
-                <a:srgbClr val="FF0000"/>
-              </a:solidFill>
-            </a:endParaRPr>
-          </a:p>
-        </p:txBody>
-      </p:sp>
-      <p:pic>
-        <p:nvPicPr>
-          <p:cNvPr id="8" name="图片 7">
-            <a:extLst>
-              <a:ext uri="{FF2B5EF4-FFF2-40B4-BE49-F238E27FC236}">
-                <a16:creationId xmlns:a16="http://schemas.microsoft.com/office/drawing/2014/main" id="{49EF2200-E4E2-439F-BF33-3FB767F15AC3}"/>
-              </a:ext>
-            </a:extLst>
-          </p:cNvPr>
-          <p:cNvPicPr>
-            <a:picLocks noChangeAspect="1"/>
-          </p:cNvPicPr>
-          <p:nvPr/>
-        </p:nvPicPr>
-        <p:blipFill>
-          <a:blip r:embed="rId4">
-            <a:extLst>
-              <a:ext uri="{28A0092B-C50C-407E-A947-70E740481C1C}">
-                <a14:useLocalDpi xmlns:a14="http://schemas.microsoft.com/office/drawing/2010/main" val="0"/>
-              </a:ext>
-            </a:extLst>
-          </a:blip>
-          <a:srcRect/>
-          <a:stretch/>
-        </p:blipFill>
-        <p:spPr>
-          <a:xfrm>
-            <a:off x="609602" y="4663440"/>
-            <a:ext cx="10972795" cy="2194558"/>
-          </a:xfrm>
-          <a:prstGeom prst="rect">
-            <a:avLst/>
-          </a:prstGeom>
-        </p:spPr>
-      </p:pic>
-      <p:sp>
-        <p:nvSpPr>
-          <p:cNvPr id="10" name="文本框 9">
-            <a:extLst>
-              <a:ext uri="{FF2B5EF4-FFF2-40B4-BE49-F238E27FC236}">
-                <a16:creationId xmlns:a16="http://schemas.microsoft.com/office/drawing/2014/main" id="{9607B53A-06D7-4CE7-A32B-9FE5DDE497DD}"/>
-              </a:ext>
-            </a:extLst>
-          </p:cNvPr>
-          <p:cNvSpPr txBox="1"/>
-          <p:nvPr/>
-        </p:nvSpPr>
-        <p:spPr>
-          <a:xfrm>
-            <a:off x="707385" y="5576053"/>
-            <a:ext cx="638316" cy="369332"/>
-          </a:xfrm>
-          <a:prstGeom prst="rect">
-            <a:avLst/>
-          </a:prstGeom>
-          <a:noFill/>
-        </p:spPr>
-        <p:txBody>
-          <a:bodyPr wrap="none" rtlCol="0">
-            <a:spAutoFit/>
-          </a:bodyPr>
-          <a:lstStyle/>
-          <a:p>
-            <a:r>
-              <a:rPr lang="en-US" altLang="zh-CN" dirty="0">
-                <a:solidFill>
-                  <a:srgbClr val="FF0000"/>
-                </a:solidFill>
-              </a:rPr>
-              <a:t>after</a:t>
-            </a:r>
-            <a:endParaRPr lang="zh-CN" altLang="en-US" dirty="0">
-              <a:solidFill>
-                <a:srgbClr val="FF0000"/>
-              </a:solidFill>
-            </a:endParaRPr>
+              <a:rPr lang="en-US" altLang="zh-CN" dirty="0"/>
+              <a:t>Increase </a:t>
+            </a:r>
+            <a:r>
+              <a:rPr lang="en-US" altLang="zh-CN" dirty="0" err="1"/>
+              <a:t>xres</a:t>
+            </a:r>
+            <a:r>
+              <a:rPr lang="en-US" altLang="zh-CN" dirty="0"/>
+              <a:t> at CRL1 to see effect on aliasing</a:t>
+            </a:r>
+          </a:p>
+          <a:p>
+            <a:endParaRPr lang="en-US" altLang="zh-CN" dirty="0"/>
+          </a:p>
+          <a:p>
+            <a:r>
+              <a:rPr lang="en-US" altLang="zh-CN" dirty="0"/>
+              <a:t>1280 x 256 x 1600</a:t>
+            </a:r>
+          </a:p>
+          <a:p>
+            <a:endParaRPr lang="en-US" altLang="zh-CN" dirty="0"/>
+          </a:p>
+          <a:p>
+            <a:endParaRPr lang="en-US" altLang="zh-CN" dirty="0"/>
+          </a:p>
+          <a:p>
+            <a:endParaRPr lang="en-US" altLang="zh-CN" dirty="0"/>
+          </a:p>
+          <a:p>
+            <a:endParaRPr lang="en-US" altLang="zh-CN" dirty="0"/>
+          </a:p>
+          <a:p>
+            <a:endParaRPr lang="en-US" altLang="zh-CN" dirty="0"/>
+          </a:p>
+          <a:p>
+            <a:endParaRPr lang="en-US" altLang="zh-CN" dirty="0"/>
+          </a:p>
+          <a:p>
+            <a:endParaRPr lang="en-US" altLang="zh-CN" dirty="0"/>
+          </a:p>
+          <a:p>
+            <a:r>
+              <a:rPr lang="en-US" altLang="zh-CN" dirty="0"/>
+              <a:t>2560 x 256 x 1600</a:t>
+            </a:r>
+            <a:endParaRPr lang="zh-CN" altLang="en-US" dirty="0"/>
           </a:p>
         </p:txBody>
       </p:sp>
     </p:spTree>
     <p:extLst>
       <p:ext uri="{BB962C8B-B14F-4D97-AF65-F5344CB8AC3E}">
-        <p14:creationId xmlns:p14="http://schemas.microsoft.com/office/powerpoint/2010/main" val="3257233518"/>
+        <p14:creationId xmlns:p14="http://schemas.microsoft.com/office/powerpoint/2010/main" val="4266531489"/>
       </p:ext>
     </p:extLst>
   </p:cSld>
@@ -4183,130 +4081,10 @@
       </p:grpSpPr>
       <p:pic>
         <p:nvPicPr>
-          <p:cNvPr id="9" name="图片 8">
-            <a:extLst>
-              <a:ext uri="{FF2B5EF4-FFF2-40B4-BE49-F238E27FC236}">
-                <a16:creationId xmlns:a16="http://schemas.microsoft.com/office/drawing/2014/main" id="{2D5BE4B2-5231-47E0-9131-6EFFCA414B58}"/>
-              </a:ext>
-            </a:extLst>
-          </p:cNvPr>
-          <p:cNvPicPr>
-            <a:picLocks noChangeAspect="1"/>
-          </p:cNvPicPr>
-          <p:nvPr/>
-        </p:nvPicPr>
-        <p:blipFill>
-          <a:blip r:embed="rId2">
-            <a:extLst>
-              <a:ext uri="{28A0092B-C50C-407E-A947-70E740481C1C}">
-                <a14:useLocalDpi xmlns:a14="http://schemas.microsoft.com/office/drawing/2010/main" val="0"/>
-              </a:ext>
-            </a:extLst>
-          </a:blip>
-          <a:srcRect/>
-          <a:stretch/>
-        </p:blipFill>
-        <p:spPr>
-          <a:xfrm>
-            <a:off x="609602" y="2331720"/>
-            <a:ext cx="10972795" cy="2194558"/>
-          </a:xfrm>
-          <a:prstGeom prst="rect">
-            <a:avLst/>
-          </a:prstGeom>
-        </p:spPr>
-      </p:pic>
-      <p:sp>
-        <p:nvSpPr>
-          <p:cNvPr id="2" name="标题 1">
-            <a:extLst>
-              <a:ext uri="{FF2B5EF4-FFF2-40B4-BE49-F238E27FC236}">
-                <a16:creationId xmlns:a16="http://schemas.microsoft.com/office/drawing/2014/main" id="{A6839868-4208-486A-9D76-CAEDAAB8F472}"/>
-              </a:ext>
-            </a:extLst>
-          </p:cNvPr>
-          <p:cNvSpPr>
-            <a:spLocks noGrp="1"/>
-          </p:cNvSpPr>
-          <p:nvPr>
-            <p:ph type="title"/>
-          </p:nvPr>
-        </p:nvSpPr>
-        <p:spPr/>
-        <p:txBody>
-          <a:bodyPr/>
-          <a:lstStyle/>
-          <a:p>
-            <a:r>
-              <a:rPr lang="en-US" altLang="zh-CN" strike="sngStrike" dirty="0"/>
-              <a:t>1280</a:t>
-            </a:r>
-            <a:r>
-              <a:rPr lang="en-US" altLang="zh-CN" dirty="0">
-                <a:solidFill>
-                  <a:srgbClr val="FF0000"/>
-                </a:solidFill>
-              </a:rPr>
-              <a:t> 5120</a:t>
-            </a:r>
-            <a:r>
-              <a:rPr lang="en-US" altLang="zh-CN" dirty="0"/>
-              <a:t> x 256 x 1600 pts at CRL1</a:t>
-            </a:r>
-            <a:endParaRPr lang="zh-CN" altLang="en-US" dirty="0"/>
-          </a:p>
-        </p:txBody>
-      </p:sp>
-      <p:sp>
-        <p:nvSpPr>
-          <p:cNvPr id="7" name="文本框 6">
-            <a:extLst>
-              <a:ext uri="{FF2B5EF4-FFF2-40B4-BE49-F238E27FC236}">
-                <a16:creationId xmlns:a16="http://schemas.microsoft.com/office/drawing/2014/main" id="{DC06195B-C19F-4F31-8D4B-A4A5CBF9A3E7}"/>
-              </a:ext>
-            </a:extLst>
-          </p:cNvPr>
-          <p:cNvSpPr txBox="1"/>
-          <p:nvPr/>
-        </p:nvSpPr>
-        <p:spPr>
-          <a:xfrm>
-            <a:off x="609602" y="3244333"/>
-            <a:ext cx="833883" cy="369332"/>
-          </a:xfrm>
-          <a:prstGeom prst="rect">
-            <a:avLst/>
-          </a:prstGeom>
-          <a:noFill/>
-        </p:spPr>
-        <p:txBody>
-          <a:bodyPr wrap="none" rtlCol="0">
-            <a:spAutoFit/>
-          </a:bodyPr>
-          <a:lstStyle/>
-          <a:p>
-            <a:r>
-              <a:rPr lang="en-US" altLang="zh-CN" dirty="0">
-                <a:solidFill>
-                  <a:srgbClr val="FF0000"/>
-                </a:solidFill>
-              </a:rPr>
-              <a:t>before</a:t>
-            </a:r>
-            <a:endParaRPr lang="zh-CN" altLang="en-US" dirty="0">
-              <a:solidFill>
-                <a:srgbClr val="FF0000"/>
-              </a:solidFill>
-            </a:endParaRPr>
-          </a:p>
-        </p:txBody>
-      </p:sp>
-      <p:pic>
-        <p:nvPicPr>
-          <p:cNvPr id="8" name="图片 7">
-            <a:extLst>
-              <a:ext uri="{FF2B5EF4-FFF2-40B4-BE49-F238E27FC236}">
-                <a16:creationId xmlns:a16="http://schemas.microsoft.com/office/drawing/2014/main" id="{49EF2200-E4E2-439F-BF33-3FB767F15AC3}"/>
+          <p:cNvPr id="6" name="图片 5">
+            <a:extLst>
+              <a:ext uri="{FF2B5EF4-FFF2-40B4-BE49-F238E27FC236}">
+                <a16:creationId xmlns:a16="http://schemas.microsoft.com/office/drawing/2014/main" id="{F0578CC5-5493-461A-BB75-8F8B136679FE}"/>
               </a:ext>
             </a:extLst>
           </p:cNvPr>
@@ -4328,8 +4106,8 @@
         </p:blipFill>
         <p:spPr>
           <a:xfrm>
-            <a:off x="609602" y="4663440"/>
-            <a:ext cx="10972795" cy="2194558"/>
+            <a:off x="1210239" y="4663440"/>
+            <a:ext cx="10972795" cy="2194559"/>
           </a:xfrm>
           <a:prstGeom prst="rect">
             <a:avLst/>
@@ -4338,10 +4116,74 @@
       </p:pic>
       <p:sp>
         <p:nvSpPr>
-          <p:cNvPr id="10" name="文本框 9">
-            <a:extLst>
-              <a:ext uri="{FF2B5EF4-FFF2-40B4-BE49-F238E27FC236}">
-                <a16:creationId xmlns:a16="http://schemas.microsoft.com/office/drawing/2014/main" id="{9607B53A-06D7-4CE7-A32B-9FE5DDE497DD}"/>
+          <p:cNvPr id="2" name="标题 1">
+            <a:extLst>
+              <a:ext uri="{FF2B5EF4-FFF2-40B4-BE49-F238E27FC236}">
+                <a16:creationId xmlns:a16="http://schemas.microsoft.com/office/drawing/2014/main" id="{2A27C84F-93ED-439A-BF83-DB8FFBAE887B}"/>
+              </a:ext>
+            </a:extLst>
+          </p:cNvPr>
+          <p:cNvSpPr>
+            <a:spLocks noGrp="1"/>
+          </p:cNvSpPr>
+          <p:nvPr>
+            <p:ph type="title"/>
+          </p:nvPr>
+        </p:nvSpPr>
+        <p:spPr/>
+        <p:txBody>
+          <a:bodyPr/>
+          <a:lstStyle/>
+          <a:p>
+            <a:r>
+              <a:rPr lang="en-US" altLang="zh-CN" dirty="0"/>
+              <a:t>Getting rid of aliasing cont’d</a:t>
+            </a:r>
+            <a:endParaRPr lang="zh-CN" altLang="en-US" dirty="0"/>
+          </a:p>
+        </p:txBody>
+      </p:sp>
+      <p:pic>
+        <p:nvPicPr>
+          <p:cNvPr id="4" name="图片 3">
+            <a:extLst>
+              <a:ext uri="{FF2B5EF4-FFF2-40B4-BE49-F238E27FC236}">
+                <a16:creationId xmlns:a16="http://schemas.microsoft.com/office/drawing/2014/main" id="{FAA3956F-7077-4A1E-918D-765B5FAE1509}"/>
+              </a:ext>
+            </a:extLst>
+          </p:cNvPr>
+          <p:cNvPicPr>
+            <a:picLocks noChangeAspect="1"/>
+          </p:cNvPicPr>
+          <p:nvPr/>
+        </p:nvPicPr>
+        <p:blipFill>
+          <a:blip r:embed="rId4">
+            <a:extLst>
+              <a:ext uri="{28A0092B-C50C-407E-A947-70E740481C1C}">
+                <a14:useLocalDpi xmlns:a14="http://schemas.microsoft.com/office/drawing/2010/main" val="0"/>
+              </a:ext>
+            </a:extLst>
+          </a:blip>
+          <a:srcRect/>
+          <a:stretch/>
+        </p:blipFill>
+        <p:spPr>
+          <a:xfrm>
+            <a:off x="1210239" y="2331720"/>
+            <a:ext cx="10972790" cy="2194557"/>
+          </a:xfrm>
+          <a:prstGeom prst="rect">
+            <a:avLst/>
+          </a:prstGeom>
+        </p:spPr>
+      </p:pic>
+      <p:sp>
+        <p:nvSpPr>
+          <p:cNvPr id="5" name="文本框 4">
+            <a:extLst>
+              <a:ext uri="{FF2B5EF4-FFF2-40B4-BE49-F238E27FC236}">
+                <a16:creationId xmlns:a16="http://schemas.microsoft.com/office/drawing/2014/main" id="{93E6867C-441A-441C-83B5-E16FE2672A67}"/>
               </a:ext>
             </a:extLst>
           </p:cNvPr>
@@ -4350,8 +4192,8 @@
         </p:nvSpPr>
         <p:spPr>
           <a:xfrm>
-            <a:off x="707385" y="5576053"/>
-            <a:ext cx="638316" cy="369332"/>
+            <a:off x="271590" y="2510133"/>
+            <a:ext cx="2695728" cy="3416320"/>
           </a:xfrm>
           <a:prstGeom prst="rect">
             <a:avLst/>
@@ -4359,31 +4201,66 @@
           <a:noFill/>
         </p:spPr>
         <p:txBody>
-          <a:bodyPr wrap="none" rtlCol="0">
+          <a:bodyPr wrap="square" rtlCol="0">
             <a:spAutoFit/>
           </a:bodyPr>
           <a:lstStyle/>
           <a:p>
             <a:r>
-              <a:rPr lang="en-US" altLang="zh-CN" dirty="0">
-                <a:solidFill>
-                  <a:srgbClr val="FF0000"/>
-                </a:solidFill>
-              </a:rPr>
-              <a:t>after</a:t>
-            </a:r>
-            <a:endParaRPr lang="zh-CN" altLang="en-US" dirty="0">
-              <a:solidFill>
-                <a:srgbClr val="FF0000"/>
-              </a:solidFill>
-            </a:endParaRPr>
+              <a:rPr lang="en-US" altLang="zh-CN" dirty="0"/>
+              <a:t>Increase </a:t>
+            </a:r>
+            <a:r>
+              <a:rPr lang="en-US" altLang="zh-CN" dirty="0" err="1"/>
+              <a:t>xres</a:t>
+            </a:r>
+            <a:r>
+              <a:rPr lang="en-US" altLang="zh-CN" dirty="0"/>
+              <a:t> at CRL1 to see effect on aliasing</a:t>
+            </a:r>
+          </a:p>
+          <a:p>
+            <a:endParaRPr lang="en-US" altLang="zh-CN" dirty="0"/>
+          </a:p>
+          <a:p>
+            <a:r>
+              <a:rPr lang="en-US" altLang="zh-CN" dirty="0"/>
+              <a:t>5120 x 256 x 1600</a:t>
+            </a:r>
+          </a:p>
+          <a:p>
+            <a:r>
+              <a:rPr lang="en-US" altLang="zh-CN" dirty="0"/>
+              <a:t>  At this point I think the aliasing is gone. </a:t>
+            </a:r>
+          </a:p>
+          <a:p>
+            <a:endParaRPr lang="en-US" altLang="zh-CN" dirty="0"/>
+          </a:p>
+          <a:p>
+            <a:endParaRPr lang="en-US" altLang="zh-CN" dirty="0"/>
+          </a:p>
+          <a:p>
+            <a:endParaRPr lang="en-US" altLang="zh-CN" dirty="0"/>
+          </a:p>
+          <a:p>
+            <a:endParaRPr lang="en-US" altLang="zh-CN" dirty="0"/>
+          </a:p>
+          <a:p>
+            <a:endParaRPr lang="en-US" altLang="zh-CN" dirty="0"/>
+          </a:p>
+          <a:p>
+            <a:r>
+              <a:rPr lang="en-US" altLang="zh-CN" dirty="0"/>
+              <a:t>10240 x 256 x 1600</a:t>
+            </a:r>
           </a:p>
         </p:txBody>
       </p:sp>
     </p:spTree>
     <p:extLst>
       <p:ext uri="{BB962C8B-B14F-4D97-AF65-F5344CB8AC3E}">
-        <p14:creationId xmlns:p14="http://schemas.microsoft.com/office/powerpoint/2010/main" val="3532392934"/>
+        <p14:creationId xmlns:p14="http://schemas.microsoft.com/office/powerpoint/2010/main" val="2586529431"/>
       </p:ext>
     </p:extLst>
   </p:cSld>
@@ -4412,10 +4289,74 @@
       </p:grpSpPr>
       <p:pic>
         <p:nvPicPr>
-          <p:cNvPr id="9" name="图片 8">
-            <a:extLst>
-              <a:ext uri="{FF2B5EF4-FFF2-40B4-BE49-F238E27FC236}">
-                <a16:creationId xmlns:a16="http://schemas.microsoft.com/office/drawing/2014/main" id="{2D5BE4B2-5231-47E0-9131-6EFFCA414B58}"/>
+          <p:cNvPr id="7" name="图片 6">
+            <a:extLst>
+              <a:ext uri="{FF2B5EF4-FFF2-40B4-BE49-F238E27FC236}">
+                <a16:creationId xmlns:a16="http://schemas.microsoft.com/office/drawing/2014/main" id="{686862DF-EE77-4483-9D13-81543112ADDB}"/>
+              </a:ext>
+            </a:extLst>
+          </p:cNvPr>
+          <p:cNvPicPr>
+            <a:picLocks noChangeAspect="1"/>
+          </p:cNvPicPr>
+          <p:nvPr/>
+        </p:nvPicPr>
+        <p:blipFill>
+          <a:blip r:embed="rId2">
+            <a:extLst>
+              <a:ext uri="{28A0092B-C50C-407E-A947-70E740481C1C}">
+                <a14:useLocalDpi xmlns:a14="http://schemas.microsoft.com/office/drawing/2010/main" val="0"/>
+              </a:ext>
+            </a:extLst>
+          </a:blip>
+          <a:srcRect/>
+          <a:stretch/>
+        </p:blipFill>
+        <p:spPr>
+          <a:xfrm>
+            <a:off x="1210239" y="4663440"/>
+            <a:ext cx="10972795" cy="2194559"/>
+          </a:xfrm>
+          <a:prstGeom prst="rect">
+            <a:avLst/>
+          </a:prstGeom>
+        </p:spPr>
+      </p:pic>
+      <p:sp>
+        <p:nvSpPr>
+          <p:cNvPr id="2" name="标题 1">
+            <a:extLst>
+              <a:ext uri="{FF2B5EF4-FFF2-40B4-BE49-F238E27FC236}">
+                <a16:creationId xmlns:a16="http://schemas.microsoft.com/office/drawing/2014/main" id="{2A27C84F-93ED-439A-BF83-DB8FFBAE887B}"/>
+              </a:ext>
+            </a:extLst>
+          </p:cNvPr>
+          <p:cNvSpPr>
+            <a:spLocks noGrp="1"/>
+          </p:cNvSpPr>
+          <p:nvPr>
+            <p:ph type="title"/>
+          </p:nvPr>
+        </p:nvSpPr>
+        <p:spPr/>
+        <p:txBody>
+          <a:bodyPr/>
+          <a:lstStyle/>
+          <a:p>
+            <a:r>
+              <a:rPr lang="en-US" altLang="zh-CN" dirty="0"/>
+              <a:t>Rest of the beamline</a:t>
+            </a:r>
+            <a:endParaRPr lang="zh-CN" altLang="en-US" dirty="0"/>
+          </a:p>
+        </p:txBody>
+      </p:sp>
+      <p:pic>
+        <p:nvPicPr>
+          <p:cNvPr id="4" name="图片 3">
+            <a:extLst>
+              <a:ext uri="{FF2B5EF4-FFF2-40B4-BE49-F238E27FC236}">
+                <a16:creationId xmlns:a16="http://schemas.microsoft.com/office/drawing/2014/main" id="{FAA3956F-7077-4A1E-918D-765B5FAE1509}"/>
               </a:ext>
             </a:extLst>
           </p:cNvPr>
@@ -4437,8 +4378,8 @@
         </p:blipFill>
         <p:spPr>
           <a:xfrm>
-            <a:off x="609604" y="2331720"/>
-            <a:ext cx="10972790" cy="2194558"/>
+            <a:off x="1210239" y="2331720"/>
+            <a:ext cx="10972790" cy="2194557"/>
           </a:xfrm>
           <a:prstGeom prst="rect">
             <a:avLst/>
@@ -4447,59 +4388,10 @@
       </p:pic>
       <p:sp>
         <p:nvSpPr>
-          <p:cNvPr id="2" name="标题 1">
-            <a:extLst>
-              <a:ext uri="{FF2B5EF4-FFF2-40B4-BE49-F238E27FC236}">
-                <a16:creationId xmlns:a16="http://schemas.microsoft.com/office/drawing/2014/main" id="{A6839868-4208-486A-9D76-CAEDAAB8F472}"/>
-              </a:ext>
-            </a:extLst>
-          </p:cNvPr>
-          <p:cNvSpPr>
-            <a:spLocks noGrp="1"/>
-          </p:cNvSpPr>
-          <p:nvPr>
-            <p:ph type="title"/>
-          </p:nvPr>
-        </p:nvSpPr>
-        <p:spPr/>
-        <p:txBody>
-          <a:bodyPr/>
-          <a:lstStyle/>
-          <a:p>
-            <a:r>
-              <a:rPr lang="en-US" altLang="zh-CN" dirty="0"/>
-              <a:t>256 x 256 x </a:t>
-            </a:r>
-            <a:r>
-              <a:rPr lang="en-US" altLang="zh-CN" strike="sngStrike" dirty="0"/>
-              <a:t>1600</a:t>
-            </a:r>
-            <a:r>
-              <a:rPr lang="en-US" altLang="zh-CN" dirty="0"/>
-              <a:t> </a:t>
-            </a:r>
-            <a:r>
-              <a:rPr lang="en-US" altLang="zh-CN" dirty="0">
-                <a:solidFill>
-                  <a:srgbClr val="FF0000"/>
-                </a:solidFill>
-              </a:rPr>
-              <a:t>3200</a:t>
-            </a:r>
-            <a:r>
-              <a:rPr lang="en-US" altLang="zh-CN" dirty="0"/>
-              <a:t> pts at HHLM output</a:t>
-            </a:r>
-            <a:endParaRPr lang="zh-CN" altLang="en-US" dirty="0"/>
-          </a:p>
-        </p:txBody>
-      </p:sp>
-      <p:sp>
-        <p:nvSpPr>
-          <p:cNvPr id="7" name="文本框 6">
-            <a:extLst>
-              <a:ext uri="{FF2B5EF4-FFF2-40B4-BE49-F238E27FC236}">
-                <a16:creationId xmlns:a16="http://schemas.microsoft.com/office/drawing/2014/main" id="{DC06195B-C19F-4F31-8D4B-A4A5CBF9A3E7}"/>
+          <p:cNvPr id="5" name="文本框 4">
+            <a:extLst>
+              <a:ext uri="{FF2B5EF4-FFF2-40B4-BE49-F238E27FC236}">
+                <a16:creationId xmlns:a16="http://schemas.microsoft.com/office/drawing/2014/main" id="{93E6867C-441A-441C-83B5-E16FE2672A67}"/>
               </a:ext>
             </a:extLst>
           </p:cNvPr>
@@ -4508,8 +4400,8 @@
         </p:nvSpPr>
         <p:spPr>
           <a:xfrm>
-            <a:off x="609602" y="3244333"/>
-            <a:ext cx="833883" cy="369332"/>
+            <a:off x="271590" y="2510133"/>
+            <a:ext cx="2695728" cy="3416320"/>
           </a:xfrm>
           <a:prstGeom prst="rect">
             <a:avLst/>
@@ -4517,68 +4409,815 @@
           <a:noFill/>
         </p:spPr>
         <p:txBody>
-          <a:bodyPr wrap="none" rtlCol="0">
+          <a:bodyPr wrap="square" rtlCol="0">
             <a:spAutoFit/>
           </a:bodyPr>
           <a:lstStyle/>
           <a:p>
-            <a:r>
-              <a:rPr lang="en-US" altLang="zh-CN" dirty="0">
-                <a:solidFill>
-                  <a:srgbClr val="FF0000"/>
-                </a:solidFill>
-              </a:rPr>
-              <a:t>before</a:t>
-            </a:r>
-            <a:endParaRPr lang="zh-CN" altLang="en-US" dirty="0">
-              <a:solidFill>
-                <a:srgbClr val="FF0000"/>
-              </a:solidFill>
-            </a:endParaRPr>
-          </a:p>
-        </p:txBody>
-      </p:sp>
-      <p:pic>
-        <p:nvPicPr>
-          <p:cNvPr id="8" name="图片 7">
-            <a:extLst>
-              <a:ext uri="{FF2B5EF4-FFF2-40B4-BE49-F238E27FC236}">
-                <a16:creationId xmlns:a16="http://schemas.microsoft.com/office/drawing/2014/main" id="{49EF2200-E4E2-439F-BF33-3FB767F15AC3}"/>
-              </a:ext>
-            </a:extLst>
-          </p:cNvPr>
-          <p:cNvPicPr>
-            <a:picLocks noChangeAspect="1"/>
-          </p:cNvPicPr>
+            <a:endParaRPr lang="en-US" altLang="zh-CN" dirty="0"/>
+          </a:p>
+          <a:p>
+            <a:endParaRPr lang="en-US" altLang="zh-CN" dirty="0"/>
+          </a:p>
+          <a:p>
+            <a:r>
+              <a:rPr lang="en-US" altLang="zh-CN" dirty="0"/>
+              <a:t>Beam before C3</a:t>
+            </a:r>
+          </a:p>
+          <a:p>
+            <a:r>
+              <a:rPr lang="en-US" altLang="zh-CN" dirty="0"/>
+              <a:t>5120 x 256 x 1600</a:t>
+            </a:r>
+          </a:p>
+          <a:p>
+            <a:endParaRPr lang="en-US" altLang="zh-CN" dirty="0"/>
+          </a:p>
+          <a:p>
+            <a:endParaRPr lang="en-US" altLang="zh-CN" dirty="0"/>
+          </a:p>
+          <a:p>
+            <a:endParaRPr lang="en-US" altLang="zh-CN" dirty="0"/>
+          </a:p>
+          <a:p>
+            <a:endParaRPr lang="en-US" altLang="zh-CN" dirty="0"/>
+          </a:p>
+          <a:p>
+            <a:endParaRPr lang="en-US" altLang="zh-CN" dirty="0"/>
+          </a:p>
+          <a:p>
+            <a:endParaRPr lang="en-US" altLang="zh-CN" dirty="0"/>
+          </a:p>
+          <a:p>
+            <a:r>
+              <a:rPr lang="en-US" altLang="zh-CN" dirty="0"/>
+              <a:t>Output</a:t>
+            </a:r>
+          </a:p>
+          <a:p>
+            <a:r>
+              <a:rPr lang="en-US" altLang="zh-CN" dirty="0"/>
+              <a:t>5120 x 256 x 1600</a:t>
+            </a:r>
+            <a:endParaRPr lang="zh-CN" altLang="en-US" dirty="0"/>
+          </a:p>
+        </p:txBody>
+      </p:sp>
+    </p:spTree>
+    <p:extLst>
+      <p:ext uri="{BB962C8B-B14F-4D97-AF65-F5344CB8AC3E}">
+        <p14:creationId xmlns:p14="http://schemas.microsoft.com/office/powerpoint/2010/main" val="4019943811"/>
+      </p:ext>
+    </p:extLst>
+  </p:cSld>
+  <p:clrMapOvr>
+    <a:masterClrMapping/>
+  </p:clrMapOvr>
+</p:sld>
+</file>
+
+<file path=ppt/slides/slide13.xml><?xml version="1.0" encoding="utf-8"?>
+<p:sld xmlns:a="http://schemas.openxmlformats.org/drawingml/2006/main" xmlns:r="http://schemas.openxmlformats.org/officeDocument/2006/relationships" xmlns:p="http://schemas.openxmlformats.org/presentationml/2006/main">
+  <p:cSld>
+    <p:spTree>
+      <p:nvGrpSpPr>
+        <p:cNvPr id="1" name=""/>
+        <p:cNvGrpSpPr/>
+        <p:nvPr/>
+      </p:nvGrpSpPr>
+      <p:grpSpPr>
+        <a:xfrm>
+          <a:off x="0" y="0"/>
+          <a:ext cx="0" cy="0"/>
+          <a:chOff x="0" y="0"/>
+          <a:chExt cx="0" cy="0"/>
+        </a:xfrm>
+      </p:grpSpPr>
+      <p:sp>
+        <p:nvSpPr>
+          <p:cNvPr id="2" name="标题 1">
+            <a:extLst>
+              <a:ext uri="{FF2B5EF4-FFF2-40B4-BE49-F238E27FC236}">
+                <a16:creationId xmlns:a16="http://schemas.microsoft.com/office/drawing/2014/main" id="{979A5729-1927-462C-AFF1-9346779D18E2}"/>
+              </a:ext>
+            </a:extLst>
+          </p:cNvPr>
+          <p:cNvSpPr>
+            <a:spLocks noGrp="1"/>
+          </p:cNvSpPr>
+          <p:nvPr>
+            <p:ph type="title"/>
+          </p:nvPr>
+        </p:nvSpPr>
+        <p:spPr/>
+        <p:txBody>
+          <a:bodyPr/>
+          <a:lstStyle/>
+          <a:p>
+            <a:r>
+              <a:rPr lang="en-US" altLang="zh-CN" dirty="0"/>
+              <a:t>Efficiency</a:t>
+            </a:r>
+            <a:endParaRPr lang="zh-CN" altLang="en-US" dirty="0"/>
+          </a:p>
+        </p:txBody>
+      </p:sp>
+      <p:graphicFrame>
+        <p:nvGraphicFramePr>
+          <p:cNvPr id="5" name="表格 5">
+            <a:extLst>
+              <a:ext uri="{FF2B5EF4-FFF2-40B4-BE49-F238E27FC236}">
+                <a16:creationId xmlns:a16="http://schemas.microsoft.com/office/drawing/2014/main" id="{40C7DEBB-2DF5-4FD7-A948-68B9491C3580}"/>
+              </a:ext>
+            </a:extLst>
+          </p:cNvPr>
+          <p:cNvGraphicFramePr>
+            <a:graphicFrameLocks noGrp="1"/>
+          </p:cNvGraphicFramePr>
+          <p:nvPr>
+            <p:extLst>
+              <p:ext uri="{D42A27DB-BD31-4B8C-83A1-F6EECF244321}">
+                <p14:modId xmlns:p14="http://schemas.microsoft.com/office/powerpoint/2010/main" val="4178584113"/>
+              </p:ext>
+            </p:extLst>
+          </p:nvPr>
+        </p:nvGraphicFramePr>
+        <p:xfrm>
+          <a:off x="2400300" y="1690688"/>
+          <a:ext cx="8127999" cy="4450080"/>
+        </p:xfrm>
+        <a:graphic>
+          <a:graphicData uri="http://schemas.openxmlformats.org/drawingml/2006/table">
+            <a:tbl>
+              <a:tblPr firstRow="1" bandRow="1">
+                <a:tableStyleId>{5C22544A-7EE6-4342-B048-85BDC9FD1C3A}</a:tableStyleId>
+              </a:tblPr>
+              <a:tblGrid>
+                <a:gridCol w="2709333">
+                  <a:extLst>
+                    <a:ext uri="{9D8B030D-6E8A-4147-A177-3AD203B41FA5}">
+                      <a16:colId xmlns:a16="http://schemas.microsoft.com/office/drawing/2014/main" val="450682259"/>
+                    </a:ext>
+                  </a:extLst>
+                </a:gridCol>
+                <a:gridCol w="2709333">
+                  <a:extLst>
+                    <a:ext uri="{9D8B030D-6E8A-4147-A177-3AD203B41FA5}">
+                      <a16:colId xmlns:a16="http://schemas.microsoft.com/office/drawing/2014/main" val="3899820638"/>
+                    </a:ext>
+                  </a:extLst>
+                </a:gridCol>
+                <a:gridCol w="2709333">
+                  <a:extLst>
+                    <a:ext uri="{9D8B030D-6E8A-4147-A177-3AD203B41FA5}">
+                      <a16:colId xmlns:a16="http://schemas.microsoft.com/office/drawing/2014/main" val="1885676097"/>
+                    </a:ext>
+                  </a:extLst>
+                </a:gridCol>
+              </a:tblGrid>
+              <a:tr h="370840">
+                <a:tc>
+                  <a:txBody>
+                    <a:bodyPr/>
+                    <a:lstStyle/>
+                    <a:p>
+                      <a:r>
+                        <a:rPr lang="en-US" altLang="zh-CN" dirty="0"/>
+                        <a:t>Component</a:t>
+                      </a:r>
+                      <a:endParaRPr lang="zh-CN" altLang="en-US" dirty="0"/>
+                    </a:p>
+                  </a:txBody>
+                  <a:tcPr/>
+                </a:tc>
+                <a:tc>
+                  <a:txBody>
+                    <a:bodyPr/>
+                    <a:lstStyle/>
+                    <a:p>
+                      <a:r>
+                        <a:rPr lang="en-US" altLang="zh-CN" dirty="0"/>
+                        <a:t>Propagation (s)</a:t>
+                      </a:r>
+                      <a:endParaRPr lang="zh-CN" altLang="en-US" dirty="0"/>
+                    </a:p>
+                  </a:txBody>
+                  <a:tcPr/>
+                </a:tc>
+                <a:tc>
+                  <a:txBody>
+                    <a:bodyPr/>
+                    <a:lstStyle/>
+                    <a:p>
+                      <a:r>
+                        <a:rPr lang="en-US" altLang="zh-CN" dirty="0"/>
+                        <a:t>Plot (s)</a:t>
+                      </a:r>
+                      <a:endParaRPr lang="zh-CN" altLang="en-US" dirty="0"/>
+                    </a:p>
+                  </a:txBody>
+                  <a:tcPr/>
+                </a:tc>
+                <a:extLst>
+                  <a:ext uri="{0D108BD9-81ED-4DB2-BD59-A6C34878D82A}">
+                    <a16:rowId xmlns:a16="http://schemas.microsoft.com/office/drawing/2014/main" val="1573894266"/>
+                  </a:ext>
+                </a:extLst>
+              </a:tr>
+              <a:tr h="370840">
+                <a:tc>
+                  <a:txBody>
+                    <a:bodyPr/>
+                    <a:lstStyle/>
+                    <a:p>
+                      <a:r>
+                        <a:rPr lang="en-US" altLang="zh-CN" dirty="0"/>
+                        <a:t>Input</a:t>
+                      </a:r>
+                      <a:endParaRPr lang="zh-CN" altLang="en-US" dirty="0"/>
+                    </a:p>
+                  </a:txBody>
+                  <a:tcPr/>
+                </a:tc>
+                <a:tc>
+                  <a:txBody>
+                    <a:bodyPr/>
+                    <a:lstStyle/>
+                    <a:p>
+                      <a:r>
+                        <a:rPr lang="en-US" altLang="zh-CN" dirty="0"/>
+                        <a:t>27.97</a:t>
+                      </a:r>
+                      <a:endParaRPr lang="zh-CN" altLang="en-US" dirty="0"/>
+                    </a:p>
+                  </a:txBody>
+                  <a:tcPr/>
+                </a:tc>
+                <a:tc>
+                  <a:txBody>
+                    <a:bodyPr/>
+                    <a:lstStyle/>
+                    <a:p>
+                      <a:r>
+                        <a:rPr lang="en-US" altLang="zh-CN" dirty="0"/>
+                        <a:t>26.58</a:t>
+                      </a:r>
+                      <a:endParaRPr lang="zh-CN" altLang="en-US" dirty="0"/>
+                    </a:p>
+                  </a:txBody>
+                  <a:tcPr/>
+                </a:tc>
+                <a:extLst>
+                  <a:ext uri="{0D108BD9-81ED-4DB2-BD59-A6C34878D82A}">
+                    <a16:rowId xmlns:a16="http://schemas.microsoft.com/office/drawing/2014/main" val="2027435609"/>
+                  </a:ext>
+                </a:extLst>
+              </a:tr>
+              <a:tr h="370840">
+                <a:tc>
+                  <a:txBody>
+                    <a:bodyPr/>
+                    <a:lstStyle/>
+                    <a:p>
+                      <a:r>
+                        <a:rPr lang="en-US" altLang="zh-CN" dirty="0"/>
+                        <a:t>CRL0+HHLM1</a:t>
+                      </a:r>
+                      <a:endParaRPr lang="zh-CN" altLang="en-US" dirty="0"/>
+                    </a:p>
+                  </a:txBody>
+                  <a:tcPr/>
+                </a:tc>
+                <a:tc>
+                  <a:txBody>
+                    <a:bodyPr/>
+                    <a:lstStyle/>
+                    <a:p>
+                      <a:r>
+                        <a:rPr lang="en-US" altLang="zh-CN" dirty="0"/>
+                        <a:t>3.64</a:t>
+                      </a:r>
+                      <a:endParaRPr lang="zh-CN" altLang="en-US" dirty="0"/>
+                    </a:p>
+                  </a:txBody>
+                  <a:tcPr/>
+                </a:tc>
+                <a:tc>
+                  <a:txBody>
+                    <a:bodyPr/>
+                    <a:lstStyle/>
+                    <a:p>
+                      <a:r>
+                        <a:rPr lang="en-US" altLang="zh-CN" dirty="0"/>
+                        <a:t>N/A</a:t>
+                      </a:r>
+                      <a:endParaRPr lang="zh-CN" altLang="en-US" dirty="0"/>
+                    </a:p>
+                  </a:txBody>
+                  <a:tcPr/>
+                </a:tc>
+                <a:extLst>
+                  <a:ext uri="{0D108BD9-81ED-4DB2-BD59-A6C34878D82A}">
+                    <a16:rowId xmlns:a16="http://schemas.microsoft.com/office/drawing/2014/main" val="1447123943"/>
+                  </a:ext>
+                </a:extLst>
+              </a:tr>
+              <a:tr h="370840">
+                <a:tc>
+                  <a:txBody>
+                    <a:bodyPr/>
+                    <a:lstStyle/>
+                    <a:p>
+                      <a:r>
+                        <a:rPr lang="en-US" altLang="zh-CN" dirty="0"/>
+                        <a:t>HHLM2</a:t>
+                      </a:r>
+                      <a:endParaRPr lang="zh-CN" altLang="en-US" dirty="0"/>
+                    </a:p>
+                  </a:txBody>
+                  <a:tcPr/>
+                </a:tc>
+                <a:tc>
+                  <a:txBody>
+                    <a:bodyPr/>
+                    <a:lstStyle/>
+                    <a:p>
+                      <a:r>
+                        <a:rPr lang="en-US" altLang="zh-CN" dirty="0"/>
+                        <a:t>2.61</a:t>
+                      </a:r>
+                      <a:endParaRPr lang="zh-CN" altLang="en-US" dirty="0"/>
+                    </a:p>
+                  </a:txBody>
+                  <a:tcPr/>
+                </a:tc>
+                <a:tc>
+                  <a:txBody>
+                    <a:bodyPr/>
+                    <a:lstStyle/>
+                    <a:p>
+                      <a:r>
+                        <a:rPr lang="en-US" altLang="zh-CN" dirty="0"/>
+                        <a:t>N/A</a:t>
+                      </a:r>
+                      <a:endParaRPr lang="zh-CN" altLang="en-US" dirty="0"/>
+                    </a:p>
+                  </a:txBody>
+                  <a:tcPr/>
+                </a:tc>
+                <a:extLst>
+                  <a:ext uri="{0D108BD9-81ED-4DB2-BD59-A6C34878D82A}">
+                    <a16:rowId xmlns:a16="http://schemas.microsoft.com/office/drawing/2014/main" val="3308129606"/>
+                  </a:ext>
+                </a:extLst>
+              </a:tr>
+              <a:tr h="370840">
+                <a:tc>
+                  <a:txBody>
+                    <a:bodyPr/>
+                    <a:lstStyle/>
+                    <a:p>
+                      <a:r>
+                        <a:rPr lang="en-US" altLang="zh-CN" dirty="0"/>
+                        <a:t>HHLM3</a:t>
+                      </a:r>
+                      <a:endParaRPr lang="zh-CN" altLang="en-US" dirty="0"/>
+                    </a:p>
+                  </a:txBody>
+                  <a:tcPr/>
+                </a:tc>
+                <a:tc>
+                  <a:txBody>
+                    <a:bodyPr/>
+                    <a:lstStyle/>
+                    <a:p>
+                      <a:r>
+                        <a:rPr lang="en-US" altLang="zh-CN" dirty="0"/>
+                        <a:t>2.60</a:t>
+                      </a:r>
+                      <a:endParaRPr lang="zh-CN" altLang="en-US" dirty="0"/>
+                    </a:p>
+                  </a:txBody>
+                  <a:tcPr/>
+                </a:tc>
+                <a:tc>
+                  <a:txBody>
+                    <a:bodyPr/>
+                    <a:lstStyle/>
+                    <a:p>
+                      <a:r>
+                        <a:rPr lang="en-US" altLang="zh-CN" dirty="0"/>
+                        <a:t>N/A</a:t>
+                      </a:r>
+                      <a:endParaRPr lang="zh-CN" altLang="en-US" dirty="0"/>
+                    </a:p>
+                  </a:txBody>
+                  <a:tcPr/>
+                </a:tc>
+                <a:extLst>
+                  <a:ext uri="{0D108BD9-81ED-4DB2-BD59-A6C34878D82A}">
+                    <a16:rowId xmlns:a16="http://schemas.microsoft.com/office/drawing/2014/main" val="3783236967"/>
+                  </a:ext>
+                </a:extLst>
+              </a:tr>
+              <a:tr h="370840">
+                <a:tc>
+                  <a:txBody>
+                    <a:bodyPr/>
+                    <a:lstStyle/>
+                    <a:p>
+                      <a:r>
+                        <a:rPr lang="en-US" altLang="zh-CN" dirty="0"/>
+                        <a:t>HHLM4</a:t>
+                      </a:r>
+                      <a:endParaRPr lang="zh-CN" altLang="en-US" dirty="0"/>
+                    </a:p>
+                  </a:txBody>
+                  <a:tcPr/>
+                </a:tc>
+                <a:tc>
+                  <a:txBody>
+                    <a:bodyPr/>
+                    <a:lstStyle/>
+                    <a:p>
+                      <a:r>
+                        <a:rPr lang="en-US" altLang="zh-CN" dirty="0"/>
+                        <a:t>2.16</a:t>
+                      </a:r>
+                      <a:endParaRPr lang="zh-CN" altLang="en-US" dirty="0"/>
+                    </a:p>
+                  </a:txBody>
+                  <a:tcPr/>
+                </a:tc>
+                <a:tc>
+                  <a:txBody>
+                    <a:bodyPr/>
+                    <a:lstStyle/>
+                    <a:p>
+                      <a:r>
+                        <a:rPr lang="en-US" altLang="zh-CN" dirty="0"/>
+                        <a:t>85.45</a:t>
+                      </a:r>
+                      <a:endParaRPr lang="zh-CN" altLang="en-US" dirty="0"/>
+                    </a:p>
+                  </a:txBody>
+                  <a:tcPr/>
+                </a:tc>
+                <a:extLst>
+                  <a:ext uri="{0D108BD9-81ED-4DB2-BD59-A6C34878D82A}">
+                    <a16:rowId xmlns:a16="http://schemas.microsoft.com/office/drawing/2014/main" val="2431611817"/>
+                  </a:ext>
+                </a:extLst>
+              </a:tr>
+              <a:tr h="370840">
+                <a:tc>
+                  <a:txBody>
+                    <a:bodyPr/>
+                    <a:lstStyle/>
+                    <a:p>
+                      <a:r>
+                        <a:rPr lang="en-US" altLang="zh-CN" dirty="0"/>
+                        <a:t>Resize in time</a:t>
+                      </a:r>
+                      <a:endParaRPr lang="zh-CN" altLang="en-US" dirty="0"/>
+                    </a:p>
+                  </a:txBody>
+                  <a:tcPr/>
+                </a:tc>
+                <a:tc>
+                  <a:txBody>
+                    <a:bodyPr/>
+                    <a:lstStyle/>
+                    <a:p>
+                      <a:r>
+                        <a:rPr lang="en-US" altLang="zh-CN" dirty="0"/>
+                        <a:t>23.82</a:t>
+                      </a:r>
+                      <a:endParaRPr lang="zh-CN" altLang="en-US" dirty="0"/>
+                    </a:p>
+                  </a:txBody>
+                  <a:tcPr/>
+                </a:tc>
+                <a:tc>
+                  <a:txBody>
+                    <a:bodyPr/>
+                    <a:lstStyle/>
+                    <a:p>
+                      <a:r>
+                        <a:rPr lang="en-US" altLang="zh-CN" dirty="0"/>
+                        <a:t>N/A</a:t>
+                      </a:r>
+                      <a:endParaRPr lang="zh-CN" altLang="en-US" dirty="0"/>
+                    </a:p>
+                  </a:txBody>
+                  <a:tcPr/>
+                </a:tc>
+                <a:extLst>
+                  <a:ext uri="{0D108BD9-81ED-4DB2-BD59-A6C34878D82A}">
+                    <a16:rowId xmlns:a16="http://schemas.microsoft.com/office/drawing/2014/main" val="1498295895"/>
+                  </a:ext>
+                </a:extLst>
+              </a:tr>
+              <a:tr h="370840">
+                <a:tc>
+                  <a:txBody>
+                    <a:bodyPr/>
+                    <a:lstStyle/>
+                    <a:p>
+                      <a:r>
+                        <a:rPr lang="en-US" altLang="zh-CN" dirty="0"/>
+                        <a:t>CC1</a:t>
+                      </a:r>
+                      <a:endParaRPr lang="zh-CN" altLang="en-US" dirty="0"/>
+                    </a:p>
+                  </a:txBody>
+                  <a:tcPr/>
+                </a:tc>
+                <a:tc>
+                  <a:txBody>
+                    <a:bodyPr/>
+                    <a:lstStyle/>
+                    <a:p>
+                      <a:r>
+                        <a:rPr lang="en-US" altLang="zh-CN" dirty="0"/>
+                        <a:t>16.96</a:t>
+                      </a:r>
+                      <a:endParaRPr lang="zh-CN" altLang="en-US" dirty="0"/>
+                    </a:p>
+                  </a:txBody>
+                  <a:tcPr/>
+                </a:tc>
+                <a:tc>
+                  <a:txBody>
+                    <a:bodyPr/>
+                    <a:lstStyle/>
+                    <a:p>
+                      <a:r>
+                        <a:rPr lang="en-US" altLang="zh-CN" dirty="0"/>
+                        <a:t>47.76</a:t>
+                      </a:r>
+                      <a:endParaRPr lang="zh-CN" altLang="en-US" dirty="0"/>
+                    </a:p>
+                  </a:txBody>
+                  <a:tcPr/>
+                </a:tc>
+                <a:extLst>
+                  <a:ext uri="{0D108BD9-81ED-4DB2-BD59-A6C34878D82A}">
+                    <a16:rowId xmlns:a16="http://schemas.microsoft.com/office/drawing/2014/main" val="1946358956"/>
+                  </a:ext>
+                </a:extLst>
+              </a:tr>
+              <a:tr h="370840">
+                <a:tc>
+                  <a:txBody>
+                    <a:bodyPr/>
+                    <a:lstStyle/>
+                    <a:p>
+                      <a:r>
+                        <a:rPr lang="en-US" altLang="zh-CN" dirty="0"/>
+                        <a:t>To focus</a:t>
+                      </a:r>
+                      <a:endParaRPr lang="zh-CN" altLang="en-US" dirty="0"/>
+                    </a:p>
+                  </a:txBody>
+                  <a:tcPr/>
+                </a:tc>
+                <a:tc>
+                  <a:txBody>
+                    <a:bodyPr/>
+                    <a:lstStyle/>
+                    <a:p>
+                      <a:r>
+                        <a:rPr lang="en-US" altLang="zh-CN" dirty="0"/>
+                        <a:t>108.09</a:t>
+                      </a:r>
+                      <a:endParaRPr lang="zh-CN" altLang="en-US" dirty="0"/>
+                    </a:p>
+                  </a:txBody>
+                  <a:tcPr/>
+                </a:tc>
+                <a:tc>
+                  <a:txBody>
+                    <a:bodyPr/>
+                    <a:lstStyle/>
+                    <a:p>
+                      <a:r>
+                        <a:rPr lang="en-US" altLang="zh-CN" dirty="0"/>
+                        <a:t>859.24</a:t>
+                      </a:r>
+                      <a:endParaRPr lang="zh-CN" altLang="en-US" dirty="0"/>
+                    </a:p>
+                  </a:txBody>
+                  <a:tcPr/>
+                </a:tc>
+                <a:extLst>
+                  <a:ext uri="{0D108BD9-81ED-4DB2-BD59-A6C34878D82A}">
+                    <a16:rowId xmlns:a16="http://schemas.microsoft.com/office/drawing/2014/main" val="726149502"/>
+                  </a:ext>
+                </a:extLst>
+              </a:tr>
+              <a:tr h="370840">
+                <a:tc>
+                  <a:txBody>
+                    <a:bodyPr/>
+                    <a:lstStyle/>
+                    <a:p>
+                      <a:r>
+                        <a:rPr lang="en-US" altLang="zh-CN" dirty="0"/>
+                        <a:t>To CC2</a:t>
+                      </a:r>
+                      <a:endParaRPr lang="zh-CN" altLang="en-US" dirty="0"/>
+                    </a:p>
+                  </a:txBody>
+                  <a:tcPr/>
+                </a:tc>
+                <a:tc>
+                  <a:txBody>
+                    <a:bodyPr/>
+                    <a:lstStyle/>
+                    <a:p>
+                      <a:r>
+                        <a:rPr lang="en-US" altLang="zh-CN" dirty="0"/>
+                        <a:t>113.72</a:t>
+                      </a:r>
+                      <a:endParaRPr lang="zh-CN" altLang="en-US" dirty="0"/>
+                    </a:p>
+                  </a:txBody>
+                  <a:tcPr/>
+                </a:tc>
+                <a:tc>
+                  <a:txBody>
+                    <a:bodyPr/>
+                    <a:lstStyle/>
+                    <a:p>
+                      <a:r>
+                        <a:rPr lang="en-US" altLang="zh-CN" dirty="0"/>
+                        <a:t>850.30</a:t>
+                      </a:r>
+                      <a:endParaRPr lang="zh-CN" altLang="en-US" dirty="0"/>
+                    </a:p>
+                  </a:txBody>
+                  <a:tcPr/>
+                </a:tc>
+                <a:extLst>
+                  <a:ext uri="{0D108BD9-81ED-4DB2-BD59-A6C34878D82A}">
+                    <a16:rowId xmlns:a16="http://schemas.microsoft.com/office/drawing/2014/main" val="1147645217"/>
+                  </a:ext>
+                </a:extLst>
+              </a:tr>
+              <a:tr h="370840">
+                <a:tc>
+                  <a:txBody>
+                    <a:bodyPr/>
+                    <a:lstStyle/>
+                    <a:p>
+                      <a:r>
+                        <a:rPr lang="en-US" altLang="zh-CN" dirty="0"/>
+                        <a:t>Output</a:t>
+                      </a:r>
+                      <a:endParaRPr lang="zh-CN" altLang="en-US" dirty="0"/>
+                    </a:p>
+                  </a:txBody>
+                  <a:tcPr/>
+                </a:tc>
+                <a:tc>
+                  <a:txBody>
+                    <a:bodyPr/>
+                    <a:lstStyle/>
+                    <a:p>
+                      <a:r>
+                        <a:rPr lang="en-US" altLang="zh-CN" dirty="0"/>
+                        <a:t>191.85</a:t>
+                      </a:r>
+                      <a:endParaRPr lang="zh-CN" altLang="en-US" dirty="0"/>
+                    </a:p>
+                  </a:txBody>
+                  <a:tcPr/>
+                </a:tc>
+                <a:tc>
+                  <a:txBody>
+                    <a:bodyPr/>
+                    <a:lstStyle/>
+                    <a:p>
+                      <a:r>
+                        <a:rPr lang="en-US" altLang="zh-CN" dirty="0"/>
+                        <a:t>870.87</a:t>
+                      </a:r>
+                      <a:endParaRPr lang="zh-CN" altLang="en-US" dirty="0"/>
+                    </a:p>
+                  </a:txBody>
+                  <a:tcPr/>
+                </a:tc>
+                <a:extLst>
+                  <a:ext uri="{0D108BD9-81ED-4DB2-BD59-A6C34878D82A}">
+                    <a16:rowId xmlns:a16="http://schemas.microsoft.com/office/drawing/2014/main" val="3154047523"/>
+                  </a:ext>
+                </a:extLst>
+              </a:tr>
+              <a:tr h="370840">
+                <a:tc>
+                  <a:txBody>
+                    <a:bodyPr/>
+                    <a:lstStyle/>
+                    <a:p>
+                      <a:r>
+                        <a:rPr lang="en-US" altLang="zh-CN" dirty="0"/>
+                        <a:t>Total</a:t>
+                      </a:r>
+                      <a:endParaRPr lang="zh-CN" altLang="en-US" dirty="0"/>
+                    </a:p>
+                  </a:txBody>
+                  <a:tcPr/>
+                </a:tc>
+                <a:tc>
+                  <a:txBody>
+                    <a:bodyPr/>
+                    <a:lstStyle/>
+                    <a:p>
+                      <a:r>
+                        <a:rPr lang="en-US" altLang="zh-CN" dirty="0"/>
+                        <a:t>493.42</a:t>
+                      </a:r>
+                      <a:endParaRPr lang="zh-CN" altLang="en-US" dirty="0"/>
+                    </a:p>
+                  </a:txBody>
+                  <a:tcPr/>
+                </a:tc>
+                <a:tc>
+                  <a:txBody>
+                    <a:bodyPr/>
+                    <a:lstStyle/>
+                    <a:p>
+                      <a:r>
+                        <a:rPr lang="en-US" altLang="zh-CN" dirty="0"/>
+                        <a:t>2740.20</a:t>
+                      </a:r>
+                      <a:endParaRPr lang="zh-CN" altLang="en-US" dirty="0"/>
+                    </a:p>
+                  </a:txBody>
+                  <a:tcPr/>
+                </a:tc>
+                <a:extLst>
+                  <a:ext uri="{0D108BD9-81ED-4DB2-BD59-A6C34878D82A}">
+                    <a16:rowId xmlns:a16="http://schemas.microsoft.com/office/drawing/2014/main" val="1581867265"/>
+                  </a:ext>
+                </a:extLst>
+              </a:tr>
+            </a:tbl>
+          </a:graphicData>
+        </a:graphic>
+      </p:graphicFrame>
+      <p:sp>
+        <p:nvSpPr>
+          <p:cNvPr id="6" name="左大括号 5">
+            <a:extLst>
+              <a:ext uri="{FF2B5EF4-FFF2-40B4-BE49-F238E27FC236}">
+                <a16:creationId xmlns:a16="http://schemas.microsoft.com/office/drawing/2014/main" id="{150E9907-F5E3-4D24-BB97-CED90F584D5D}"/>
+              </a:ext>
+            </a:extLst>
+          </p:cNvPr>
+          <p:cNvSpPr/>
           <p:nvPr/>
-        </p:nvPicPr>
-        <p:blipFill>
-          <a:blip r:embed="rId4">
-            <a:extLst>
-              <a:ext uri="{28A0092B-C50C-407E-A947-70E740481C1C}">
-                <a14:useLocalDpi xmlns:a14="http://schemas.microsoft.com/office/drawing/2010/main" val="0"/>
-              </a:ext>
-            </a:extLst>
-          </a:blip>
-          <a:srcRect/>
-          <a:stretch/>
-        </p:blipFill>
+        </p:nvSpPr>
         <p:spPr>
           <a:xfrm>
-            <a:off x="609604" y="4663440"/>
-            <a:ext cx="10972790" cy="2194558"/>
+            <a:off x="2233931" y="2146300"/>
+            <a:ext cx="45719" cy="1733550"/>
           </a:xfrm>
-          <a:prstGeom prst="rect">
+          <a:prstGeom prst="leftBrace">
             <a:avLst/>
           </a:prstGeom>
         </p:spPr>
-      </p:pic>
-      <p:sp>
-        <p:nvSpPr>
-          <p:cNvPr id="10" name="文本框 9">
-            <a:extLst>
-              <a:ext uri="{FF2B5EF4-FFF2-40B4-BE49-F238E27FC236}">
-                <a16:creationId xmlns:a16="http://schemas.microsoft.com/office/drawing/2014/main" id="{9607B53A-06D7-4CE7-A32B-9FE5DDE497DD}"/>
+        <p:style>
+          <a:lnRef idx="1">
+            <a:schemeClr val="accent1"/>
+          </a:lnRef>
+          <a:fillRef idx="0">
+            <a:schemeClr val="accent1"/>
+          </a:fillRef>
+          <a:effectRef idx="0">
+            <a:schemeClr val="accent1"/>
+          </a:effectRef>
+          <a:fontRef idx="minor">
+            <a:schemeClr val="tx1"/>
+          </a:fontRef>
+        </p:style>
+        <p:txBody>
+          <a:bodyPr rtlCol="0" anchor="ctr"/>
+          <a:lstStyle/>
+          <a:p>
+            <a:pPr algn="ctr"/>
+            <a:endParaRPr lang="zh-CN" altLang="en-US"/>
+          </a:p>
+        </p:txBody>
+      </p:sp>
+      <p:sp>
+        <p:nvSpPr>
+          <p:cNvPr id="7" name="文本框 6">
+            <a:extLst>
+              <a:ext uri="{FF2B5EF4-FFF2-40B4-BE49-F238E27FC236}">
+                <a16:creationId xmlns:a16="http://schemas.microsoft.com/office/drawing/2014/main" id="{8FFB509A-C24D-4430-91A5-0E355AB52B0C}"/>
               </a:ext>
             </a:extLst>
           </p:cNvPr>
@@ -4587,8 +5226,8 @@
         </p:nvSpPr>
         <p:spPr>
           <a:xfrm>
-            <a:off x="707385" y="5576053"/>
-            <a:ext cx="638316" cy="369332"/>
+            <a:off x="132554" y="2825512"/>
+            <a:ext cx="1733167" cy="369332"/>
           </a:xfrm>
           <a:prstGeom prst="rect">
             <a:avLst/>
@@ -4602,27 +5241,87 @@
           <a:lstStyle/>
           <a:p>
             <a:r>
-              <a:rPr lang="en-US" altLang="zh-CN" dirty="0">
-                <a:solidFill>
-                  <a:srgbClr val="FF0000"/>
-                </a:solidFill>
-              </a:rPr>
-              <a:t>after</a:t>
-            </a:r>
-            <a:endParaRPr lang="zh-CN" altLang="en-US" dirty="0">
-              <a:solidFill>
-                <a:srgbClr val="FF0000"/>
-              </a:solidFill>
-            </a:endParaRPr>
-          </a:p>
-        </p:txBody>
-      </p:sp>
-      <p:sp>
-        <p:nvSpPr>
-          <p:cNvPr id="4" name="文本框 3">
-            <a:extLst>
-              <a:ext uri="{FF2B5EF4-FFF2-40B4-BE49-F238E27FC236}">
-                <a16:creationId xmlns:a16="http://schemas.microsoft.com/office/drawing/2014/main" id="{289929E3-2A56-4CE9-B088-ACD74C90507A}"/>
+              <a:rPr lang="en-US" altLang="zh-CN" dirty="0"/>
+              <a:t>256 x</a:t>
+            </a:r>
+            <a:r>
+              <a:rPr lang="zh-CN" altLang="en-US" dirty="0"/>
+              <a:t> </a:t>
+            </a:r>
+            <a:r>
+              <a:rPr lang="en-US" altLang="zh-CN" dirty="0"/>
+              <a:t>256</a:t>
+            </a:r>
+            <a:r>
+              <a:rPr lang="zh-CN" altLang="en-US" dirty="0"/>
+              <a:t> </a:t>
+            </a:r>
+            <a:r>
+              <a:rPr lang="en-US" altLang="zh-CN" dirty="0"/>
+              <a:t>x</a:t>
+            </a:r>
+            <a:r>
+              <a:rPr lang="zh-CN" altLang="en-US" dirty="0"/>
+              <a:t> </a:t>
+            </a:r>
+            <a:r>
+              <a:rPr lang="en-US" altLang="zh-CN" dirty="0"/>
+              <a:t>798</a:t>
+            </a:r>
+            <a:endParaRPr lang="zh-CN" altLang="en-US" dirty="0"/>
+          </a:p>
+        </p:txBody>
+      </p:sp>
+      <p:sp>
+        <p:nvSpPr>
+          <p:cNvPr id="10" name="左大括号 9">
+            <a:extLst>
+              <a:ext uri="{FF2B5EF4-FFF2-40B4-BE49-F238E27FC236}">
+                <a16:creationId xmlns:a16="http://schemas.microsoft.com/office/drawing/2014/main" id="{32F7DD12-A007-4182-B84C-F71E5BCE10F2}"/>
+              </a:ext>
+            </a:extLst>
+          </p:cNvPr>
+          <p:cNvSpPr/>
+          <p:nvPr/>
+        </p:nvSpPr>
+        <p:spPr>
+          <a:xfrm>
+            <a:off x="2227581" y="3987800"/>
+            <a:ext cx="45719" cy="571500"/>
+          </a:xfrm>
+          <a:prstGeom prst="leftBrace">
+            <a:avLst/>
+          </a:prstGeom>
+        </p:spPr>
+        <p:style>
+          <a:lnRef idx="1">
+            <a:schemeClr val="accent1"/>
+          </a:lnRef>
+          <a:fillRef idx="0">
+            <a:schemeClr val="accent1"/>
+          </a:fillRef>
+          <a:effectRef idx="0">
+            <a:schemeClr val="accent1"/>
+          </a:effectRef>
+          <a:fontRef idx="minor">
+            <a:schemeClr val="tx1"/>
+          </a:fontRef>
+        </p:style>
+        <p:txBody>
+          <a:bodyPr rtlCol="0" anchor="ctr"/>
+          <a:lstStyle/>
+          <a:p>
+            <a:pPr algn="ctr"/>
+            <a:endParaRPr lang="zh-CN" altLang="en-US"/>
+          </a:p>
+        </p:txBody>
+      </p:sp>
+      <p:sp>
+        <p:nvSpPr>
+          <p:cNvPr id="11" name="文本框 10">
+            <a:extLst>
+              <a:ext uri="{FF2B5EF4-FFF2-40B4-BE49-F238E27FC236}">
+                <a16:creationId xmlns:a16="http://schemas.microsoft.com/office/drawing/2014/main" id="{40913485-FDAE-4265-94A2-8FB78B16D561}"/>
               </a:ext>
             </a:extLst>
           </p:cNvPr>
@@ -4631,8 +5330,8 @@
         </p:nvSpPr>
         <p:spPr>
           <a:xfrm>
-            <a:off x="10510791" y="5160554"/>
-            <a:ext cx="1686018" cy="1200329"/>
+            <a:off x="132554" y="4088884"/>
+            <a:ext cx="1854996" cy="369332"/>
           </a:xfrm>
           <a:prstGeom prst="rect">
             <a:avLst/>
@@ -4647,7 +5346,135 @@
           <a:p>
             <a:r>
               <a:rPr lang="en-US" altLang="zh-CN" dirty="0"/>
-              <a:t>Increasing the time resolution doesn’t really do much</a:t>
+              <a:t>256 x</a:t>
+            </a:r>
+            <a:r>
+              <a:rPr lang="zh-CN" altLang="en-US" dirty="0"/>
+              <a:t> </a:t>
+            </a:r>
+            <a:r>
+              <a:rPr lang="en-US" altLang="zh-CN" dirty="0"/>
+              <a:t>256</a:t>
+            </a:r>
+            <a:r>
+              <a:rPr lang="zh-CN" altLang="en-US" dirty="0"/>
+              <a:t> </a:t>
+            </a:r>
+            <a:r>
+              <a:rPr lang="en-US" altLang="zh-CN" dirty="0"/>
+              <a:t>x</a:t>
+            </a:r>
+            <a:r>
+              <a:rPr lang="zh-CN" altLang="en-US" dirty="0"/>
+              <a:t> </a:t>
+            </a:r>
+            <a:r>
+              <a:rPr lang="en-US" altLang="zh-CN" dirty="0"/>
+              <a:t>1600</a:t>
+            </a:r>
+            <a:endParaRPr lang="zh-CN" altLang="en-US" dirty="0"/>
+          </a:p>
+        </p:txBody>
+      </p:sp>
+      <p:sp>
+        <p:nvSpPr>
+          <p:cNvPr id="12" name="左大括号 11">
+            <a:extLst>
+              <a:ext uri="{FF2B5EF4-FFF2-40B4-BE49-F238E27FC236}">
+                <a16:creationId xmlns:a16="http://schemas.microsoft.com/office/drawing/2014/main" id="{32F2F9FE-F1FE-4B57-B0FB-D06C1D492109}"/>
+              </a:ext>
+            </a:extLst>
+          </p:cNvPr>
+          <p:cNvSpPr/>
+          <p:nvPr/>
+        </p:nvSpPr>
+        <p:spPr>
+          <a:xfrm>
+            <a:off x="2230121" y="4699000"/>
+            <a:ext cx="45719" cy="1327150"/>
+          </a:xfrm>
+          <a:prstGeom prst="leftBrace">
+            <a:avLst/>
+          </a:prstGeom>
+        </p:spPr>
+        <p:style>
+          <a:lnRef idx="1">
+            <a:schemeClr val="accent1"/>
+          </a:lnRef>
+          <a:fillRef idx="0">
+            <a:schemeClr val="accent1"/>
+          </a:fillRef>
+          <a:effectRef idx="0">
+            <a:schemeClr val="accent1"/>
+          </a:effectRef>
+          <a:fontRef idx="minor">
+            <a:schemeClr val="tx1"/>
+          </a:fontRef>
+        </p:style>
+        <p:txBody>
+          <a:bodyPr rtlCol="0" anchor="ctr"/>
+          <a:lstStyle/>
+          <a:p>
+            <a:pPr algn="ctr"/>
+            <a:endParaRPr lang="zh-CN" altLang="en-US"/>
+          </a:p>
+        </p:txBody>
+      </p:sp>
+      <p:sp>
+        <p:nvSpPr>
+          <p:cNvPr id="13" name="文本框 12">
+            <a:extLst>
+              <a:ext uri="{FF2B5EF4-FFF2-40B4-BE49-F238E27FC236}">
+                <a16:creationId xmlns:a16="http://schemas.microsoft.com/office/drawing/2014/main" id="{FBB2F326-3F52-4712-A119-32B4482A93F0}"/>
+              </a:ext>
+            </a:extLst>
+          </p:cNvPr>
+          <p:cNvSpPr txBox="1"/>
+          <p:nvPr/>
+        </p:nvSpPr>
+        <p:spPr>
+          <a:xfrm>
+            <a:off x="44052" y="5177909"/>
+            <a:ext cx="2032000" cy="369332"/>
+          </a:xfrm>
+          <a:prstGeom prst="rect">
+            <a:avLst/>
+          </a:prstGeom>
+          <a:noFill/>
+        </p:spPr>
+        <p:txBody>
+          <a:bodyPr wrap="square" rtlCol="0">
+            <a:spAutoFit/>
+          </a:bodyPr>
+          <a:lstStyle/>
+          <a:p>
+            <a:r>
+              <a:rPr lang="en-US" altLang="zh-CN" dirty="0"/>
+              <a:t>5120 x</a:t>
+            </a:r>
+            <a:r>
+              <a:rPr lang="zh-CN" altLang="en-US" dirty="0"/>
+              <a:t> </a:t>
+            </a:r>
+            <a:r>
+              <a:rPr lang="en-US" altLang="zh-CN" dirty="0"/>
+              <a:t>256</a:t>
+            </a:r>
+            <a:r>
+              <a:rPr lang="zh-CN" altLang="en-US" dirty="0"/>
+              <a:t> </a:t>
+            </a:r>
+            <a:r>
+              <a:rPr lang="en-US" altLang="zh-CN" dirty="0"/>
+              <a:t>x</a:t>
+            </a:r>
+            <a:r>
+              <a:rPr lang="zh-CN" altLang="en-US" dirty="0"/>
+              <a:t> </a:t>
+            </a:r>
+            <a:r>
+              <a:rPr lang="en-US" altLang="zh-CN" dirty="0"/>
+              <a:t>1600</a:t>
             </a:r>
             <a:endParaRPr lang="zh-CN" altLang="en-US" dirty="0"/>
           </a:p>
@@ -4656,7 +5483,7 @@
     </p:spTree>
     <p:extLst>
       <p:ext uri="{BB962C8B-B14F-4D97-AF65-F5344CB8AC3E}">
-        <p14:creationId xmlns:p14="http://schemas.microsoft.com/office/powerpoint/2010/main" val="507141760"/>
+        <p14:creationId xmlns:p14="http://schemas.microsoft.com/office/powerpoint/2010/main" val="1641928288"/>
       </p:ext>
     </p:extLst>
   </p:cSld>
@@ -4773,14 +5600,14 @@
             <a:pPr lvl="1"/>
             <a:r>
               <a:rPr lang="en-US" altLang="zh-CN" dirty="0"/>
-              <a:t>Aliasing</a:t>
+              <a:t>Get rid of aliasing</a:t>
             </a:r>
           </a:p>
           <a:p>
             <a:pPr lvl="1"/>
             <a:r>
               <a:rPr lang="en-US" altLang="zh-CN" dirty="0"/>
-              <a:t>Changing sampling parameters</a:t>
+              <a:t>Efficiency</a:t>
             </a:r>
             <a:endParaRPr lang="zh-CN" altLang="en-US" dirty="0"/>
           </a:p>
@@ -4940,7 +5767,7 @@
           <a:p>
             <a:r>
               <a:rPr lang="en-US" altLang="zh-CN" sz="2800" dirty="0"/>
-              <a:t>	256 x 256 x 198 for HHLM</a:t>
+              <a:t>	256 x 256 x 998 (100 fs)</a:t>
             </a:r>
           </a:p>
           <a:p>
@@ -5307,8 +6134,8 @@
         </p:blipFill>
         <p:spPr>
           <a:xfrm>
-            <a:off x="609600" y="2331720"/>
-            <a:ext cx="10972800" cy="2194559"/>
+            <a:off x="1219206" y="2331720"/>
+            <a:ext cx="10972796" cy="2194559"/>
           </a:xfrm>
           <a:prstGeom prst="rect">
             <a:avLst/>
@@ -5342,8 +6169,8 @@
         </p:blipFill>
         <p:spPr>
           <a:xfrm>
-            <a:off x="609600" y="4663440"/>
-            <a:ext cx="10972800" cy="2194559"/>
+            <a:off x="1219206" y="4663440"/>
+            <a:ext cx="10972796" cy="2194559"/>
           </a:xfrm>
           <a:prstGeom prst="rect">
             <a:avLst/>
@@ -5365,7 +6192,7 @@
         <p:spPr>
           <a:xfrm>
             <a:off x="316413" y="3244334"/>
-            <a:ext cx="1343638" cy="369332"/>
+            <a:ext cx="1733167" cy="646331"/>
           </a:xfrm>
           <a:prstGeom prst="rect">
             <a:avLst/>
@@ -5384,7 +6211,17 @@
                   <a:srgbClr val="FF0000"/>
                 </a:solidFill>
               </a:rPr>
-              <a:t>Input, 400fs</a:t>
+              <a:t>Input, 100fs</a:t>
+            </a:r>
+          </a:p>
+          <a:p>
+            <a:r>
+              <a:rPr lang="en-US" altLang="zh-CN" dirty="0">
+                <a:solidFill>
+                  <a:srgbClr val="FF0000"/>
+                </a:solidFill>
+              </a:rPr>
+              <a:t>256 x 256 x 998</a:t>
             </a:r>
             <a:endParaRPr lang="zh-CN" altLang="en-US" dirty="0">
               <a:solidFill>
@@ -5409,7 +6246,7 @@
         <p:spPr>
           <a:xfrm>
             <a:off x="316413" y="5576054"/>
-            <a:ext cx="997389" cy="369332"/>
+            <a:ext cx="1733167" cy="923330"/>
           </a:xfrm>
           <a:prstGeom prst="rect">
             <a:avLst/>
@@ -5430,6 +6267,23 @@
               </a:rPr>
               <a:t>After C1</a:t>
             </a:r>
+          </a:p>
+          <a:p>
+            <a:r>
+              <a:rPr lang="en-US" altLang="zh-CN" dirty="0">
+                <a:solidFill>
+                  <a:srgbClr val="FF0000"/>
+                </a:solidFill>
+              </a:rPr>
+              <a:t>256 x 256 x 998</a:t>
+            </a:r>
+            <a:endParaRPr lang="zh-CN" altLang="en-US" dirty="0">
+              <a:solidFill>
+                <a:srgbClr val="FF0000"/>
+              </a:solidFill>
+            </a:endParaRPr>
+          </a:p>
+          <a:p>
             <a:endParaRPr lang="zh-CN" altLang="en-US" dirty="0">
               <a:solidFill>
                 <a:srgbClr val="FF0000"/>
@@ -5529,8 +6383,8 @@
         </p:blipFill>
         <p:spPr>
           <a:xfrm>
-            <a:off x="609600" y="0"/>
-            <a:ext cx="10972800" cy="2194559"/>
+            <a:off x="1210239" y="0"/>
+            <a:ext cx="10972796" cy="2194559"/>
           </a:xfrm>
           <a:prstGeom prst="rect">
             <a:avLst/>
@@ -5564,8 +6418,8 @@
         </p:blipFill>
         <p:spPr>
           <a:xfrm>
-            <a:off x="609600" y="2331720"/>
-            <a:ext cx="10972800" cy="2194559"/>
+            <a:off x="1210239" y="2331720"/>
+            <a:ext cx="10972796" cy="2194559"/>
           </a:xfrm>
           <a:prstGeom prst="rect">
             <a:avLst/>
@@ -5599,8 +6453,8 @@
         </p:blipFill>
         <p:spPr>
           <a:xfrm>
-            <a:off x="609600" y="4663440"/>
-            <a:ext cx="10972800" cy="2194559"/>
+            <a:off x="1210239" y="4663440"/>
+            <a:ext cx="10972796" cy="2194559"/>
           </a:xfrm>
           <a:prstGeom prst="rect">
             <a:avLst/>
@@ -5622,7 +6476,7 @@
         <p:spPr>
           <a:xfrm>
             <a:off x="316413" y="912614"/>
-            <a:ext cx="997389" cy="369332"/>
+            <a:ext cx="1733167" cy="923330"/>
           </a:xfrm>
           <a:prstGeom prst="rect">
             <a:avLst/>
@@ -5643,12 +6497,29 @@
               </a:rPr>
               <a:t>After C2</a:t>
             </a:r>
+          </a:p>
+          <a:p>
+            <a:r>
+              <a:rPr lang="en-US" altLang="zh-CN" dirty="0">
+                <a:solidFill>
+                  <a:srgbClr val="FF0000"/>
+                </a:solidFill>
+              </a:rPr>
+              <a:t>256 x 256 x 998</a:t>
+            </a:r>
             <a:endParaRPr lang="zh-CN" altLang="en-US" dirty="0">
               <a:solidFill>
                 <a:srgbClr val="FF0000"/>
               </a:solidFill>
             </a:endParaRPr>
           </a:p>
+          <a:p>
+            <a:endParaRPr lang="zh-CN" altLang="en-US" dirty="0">
+              <a:solidFill>
+                <a:srgbClr val="FF0000"/>
+              </a:solidFill>
+            </a:endParaRPr>
+          </a:p>
         </p:txBody>
       </p:sp>
       <p:sp>
@@ -5666,7 +6537,7 @@
         <p:spPr>
           <a:xfrm>
             <a:off x="316413" y="3244334"/>
-            <a:ext cx="997389" cy="369332"/>
+            <a:ext cx="1733167" cy="923330"/>
           </a:xfrm>
           <a:prstGeom prst="rect">
             <a:avLst/>
@@ -5688,6 +6559,28 @@
               <a:t>After C3</a:t>
             </a:r>
           </a:p>
+          <a:p>
+            <a:r>
+              <a:rPr lang="en-US" altLang="zh-CN" dirty="0">
+                <a:solidFill>
+                  <a:srgbClr val="FF0000"/>
+                </a:solidFill>
+              </a:rPr>
+              <a:t>256 x 256 x 998</a:t>
+            </a:r>
+            <a:endParaRPr lang="zh-CN" altLang="en-US" dirty="0">
+              <a:solidFill>
+                <a:srgbClr val="FF0000"/>
+              </a:solidFill>
+            </a:endParaRPr>
+          </a:p>
+          <a:p>
+            <a:endParaRPr lang="en-US" altLang="zh-CN" dirty="0">
+              <a:solidFill>
+                <a:srgbClr val="FF0000"/>
+              </a:solidFill>
+            </a:endParaRPr>
+          </a:p>
         </p:txBody>
       </p:sp>
       <p:sp>
@@ -5705,7 +6598,7 @@
         <p:spPr>
           <a:xfrm>
             <a:off x="316413" y="5576054"/>
-            <a:ext cx="997389" cy="369332"/>
+            <a:ext cx="1733167" cy="923330"/>
           </a:xfrm>
           <a:prstGeom prst="rect">
             <a:avLst/>
@@ -5726,6 +6619,23 @@
               </a:rPr>
               <a:t>After C4</a:t>
             </a:r>
+          </a:p>
+          <a:p>
+            <a:r>
+              <a:rPr lang="en-US" altLang="zh-CN" dirty="0">
+                <a:solidFill>
+                  <a:srgbClr val="FF0000"/>
+                </a:solidFill>
+              </a:rPr>
+              <a:t>256 x 256 x 998</a:t>
+            </a:r>
+            <a:endParaRPr lang="zh-CN" altLang="en-US" dirty="0">
+              <a:solidFill>
+                <a:srgbClr val="FF0000"/>
+              </a:solidFill>
+            </a:endParaRPr>
+          </a:p>
+          <a:p>
             <a:endParaRPr lang="zh-CN" altLang="en-US" dirty="0">
               <a:solidFill>
                 <a:srgbClr val="FF0000"/>
@@ -5809,7 +6719,12 @@
             <p:ph idx="1"/>
           </p:nvPr>
         </p:nvSpPr>
-        <p:spPr/>
+        <p:spPr>
+          <a:xfrm>
+            <a:off x="838200" y="1814867"/>
+            <a:ext cx="10515600" cy="4351338"/>
+          </a:xfrm>
+        </p:spPr>
         <p:txBody>
           <a:bodyPr/>
           <a:lstStyle/>
@@ -5850,14 +6765,7 @@
             <a:pPr lvl="1"/>
             <a:r>
               <a:rPr lang="en-US" altLang="zh-CN" dirty="0"/>
-              <a:t>256 x 256 x 396 pts at HHLM output (for 400fs incident beam)</a:t>
-            </a:r>
-          </a:p>
-          <a:p>
-            <a:pPr lvl="1"/>
-            <a:r>
-              <a:rPr lang="en-US" altLang="zh-CN" dirty="0"/>
-              <a:t>1280 x 256 x 396 pts at CRL1</a:t>
+              <a:t>256 x 256 x 798 pts at HHLM output (for 100fs incident beam)</a:t>
             </a:r>
           </a:p>
           <a:p>
@@ -5931,8 +6839,8 @@
         </p:blipFill>
         <p:spPr>
           <a:xfrm>
-            <a:off x="609602" y="2331720"/>
-            <a:ext cx="10972795" cy="2194559"/>
+            <a:off x="1210243" y="2331720"/>
+            <a:ext cx="10972795" cy="2194558"/>
           </a:xfrm>
           <a:prstGeom prst="rect">
             <a:avLst/>
@@ -5966,8 +6874,8 @@
         </p:blipFill>
         <p:spPr>
           <a:xfrm>
-            <a:off x="609602" y="4663440"/>
-            <a:ext cx="10972795" cy="2194559"/>
+            <a:off x="1210243" y="4663440"/>
+            <a:ext cx="10972795" cy="2194558"/>
           </a:xfrm>
           <a:prstGeom prst="rect">
             <a:avLst/>
@@ -5989,7 +6897,7 @@
         <p:spPr>
           <a:xfrm>
             <a:off x="316413" y="3244334"/>
-            <a:ext cx="1140056" cy="369332"/>
+            <a:ext cx="1854995" cy="646331"/>
           </a:xfrm>
           <a:prstGeom prst="rect">
             <a:avLst/>
@@ -6010,6 +6918,16 @@
               </a:rPr>
               <a:t>After CC1</a:t>
             </a:r>
+          </a:p>
+          <a:p>
+            <a:r>
+              <a:rPr lang="en-US" altLang="zh-CN" dirty="0">
+                <a:solidFill>
+                  <a:srgbClr val="FF0000"/>
+                </a:solidFill>
+              </a:rPr>
+              <a:t>256 x 256 x 1600</a:t>
+            </a:r>
             <a:endParaRPr lang="zh-CN" altLang="en-US" dirty="0">
               <a:solidFill>
                 <a:srgbClr val="FF0000"/>
@@ -6033,7 +6951,7 @@
         <p:spPr>
           <a:xfrm>
             <a:off x="316413" y="5576054"/>
-            <a:ext cx="1952779" cy="369332"/>
+            <a:ext cx="1952779" cy="646331"/>
           </a:xfrm>
           <a:prstGeom prst="rect">
             <a:avLst/>
@@ -6053,6 +6971,16 @@
                 </a:solidFill>
               </a:rPr>
               <a:t>At focus, open slit</a:t>
+            </a:r>
+          </a:p>
+          <a:p>
+            <a:r>
+              <a:rPr lang="en-US" altLang="zh-CN" dirty="0">
+                <a:solidFill>
+                  <a:srgbClr val="FF0000"/>
+                </a:solidFill>
+              </a:rPr>
+              <a:t>256 x 256 x 1600</a:t>
             </a:r>
             <a:endParaRPr lang="zh-CN" altLang="en-US" dirty="0">
               <a:solidFill>
@@ -6197,8 +7125,8 @@
         </p:blipFill>
         <p:spPr>
           <a:xfrm>
-            <a:off x="609602" y="2331720"/>
-            <a:ext cx="10972795" cy="2194558"/>
+            <a:off x="1210239" y="2331720"/>
+            <a:ext cx="10972790" cy="2194558"/>
           </a:xfrm>
           <a:prstGeom prst="rect">
             <a:avLst/>
@@ -6232,8 +7160,8 @@
         </p:blipFill>
         <p:spPr>
           <a:xfrm>
-            <a:off x="609602" y="4663440"/>
-            <a:ext cx="10972795" cy="2194558"/>
+            <a:off x="1210239" y="4663440"/>
+            <a:ext cx="10972790" cy="2194558"/>
           </a:xfrm>
           <a:prstGeom prst="rect">
             <a:avLst/>
@@ -6255,7 +7183,7 @@
         <p:spPr>
           <a:xfrm>
             <a:off x="316413" y="3244334"/>
-            <a:ext cx="1298753" cy="369332"/>
+            <a:ext cx="1854995" cy="923330"/>
           </a:xfrm>
           <a:prstGeom prst="rect">
             <a:avLst/>
@@ -6276,12 +7204,29 @@
               </a:rPr>
               <a:t>Before CC2</a:t>
             </a:r>
+          </a:p>
+          <a:p>
+            <a:r>
+              <a:rPr lang="en-US" altLang="zh-CN" dirty="0">
+                <a:solidFill>
+                  <a:srgbClr val="FF0000"/>
+                </a:solidFill>
+              </a:rPr>
+              <a:t>256 x 256 x 1600</a:t>
+            </a:r>
             <a:endParaRPr lang="zh-CN" altLang="en-US" dirty="0">
               <a:solidFill>
                 <a:srgbClr val="FF0000"/>
               </a:solidFill>
             </a:endParaRPr>
           </a:p>
+          <a:p>
+            <a:endParaRPr lang="zh-CN" altLang="en-US" dirty="0">
+              <a:solidFill>
+                <a:srgbClr val="FF0000"/>
+              </a:solidFill>
+            </a:endParaRPr>
+          </a:p>
         </p:txBody>
       </p:sp>
       <p:sp>
@@ -6299,7 +7244,7 @@
         <p:spPr>
           <a:xfrm>
             <a:off x="316413" y="5576054"/>
-            <a:ext cx="893193" cy="369332"/>
+            <a:ext cx="1854995" cy="923330"/>
           </a:xfrm>
           <a:prstGeom prst="rect">
             <a:avLst/>
@@ -6320,6 +7265,23 @@
               </a:rPr>
               <a:t>Output</a:t>
             </a:r>
+          </a:p>
+          <a:p>
+            <a:r>
+              <a:rPr lang="en-US" altLang="zh-CN" dirty="0">
+                <a:solidFill>
+                  <a:srgbClr val="FF0000"/>
+                </a:solidFill>
+              </a:rPr>
+              <a:t>256 x 256 x 1600</a:t>
+            </a:r>
+            <a:endParaRPr lang="zh-CN" altLang="en-US" dirty="0">
+              <a:solidFill>
+                <a:srgbClr val="FF0000"/>
+              </a:solidFill>
+            </a:endParaRPr>
+          </a:p>
+          <a:p>
             <a:endParaRPr lang="zh-CN" altLang="en-US" dirty="0">
               <a:solidFill>
                 <a:srgbClr val="FF0000"/>
@@ -6392,12 +7354,48 @@
           <a:chExt cx="0" cy="0"/>
         </a:xfrm>
       </p:grpSpPr>
+      <p:pic>
+        <p:nvPicPr>
+          <p:cNvPr id="7" name="图片 6" descr="图形用户界面, 图表&#10;&#10;描述已自动生成">
+            <a:extLst>
+              <a:ext uri="{FF2B5EF4-FFF2-40B4-BE49-F238E27FC236}">
+                <a16:creationId xmlns:a16="http://schemas.microsoft.com/office/drawing/2014/main" id="{686862DF-EE77-4483-9D13-81543112ADDB}"/>
+              </a:ext>
+            </a:extLst>
+          </p:cNvPr>
+          <p:cNvPicPr>
+            <a:picLocks noChangeAspect="1"/>
+          </p:cNvPicPr>
+          <p:nvPr/>
+        </p:nvPicPr>
+        <p:blipFill>
+          <a:blip r:embed="rId2">
+            <a:extLst>
+              <a:ext uri="{28A0092B-C50C-407E-A947-70E740481C1C}">
+                <a14:useLocalDpi xmlns:a14="http://schemas.microsoft.com/office/drawing/2010/main" val="0"/>
+              </a:ext>
+            </a:extLst>
+          </a:blip>
+          <a:stretch>
+            <a:fillRect/>
+          </a:stretch>
+        </p:blipFill>
+        <p:spPr>
+          <a:xfrm>
+            <a:off x="1210237" y="4663440"/>
+            <a:ext cx="10972800" cy="2194560"/>
+          </a:xfrm>
+          <a:prstGeom prst="rect">
+            <a:avLst/>
+          </a:prstGeom>
+        </p:spPr>
+      </p:pic>
       <p:sp>
         <p:nvSpPr>
           <p:cNvPr id="2" name="标题 1">
             <a:extLst>
               <a:ext uri="{FF2B5EF4-FFF2-40B4-BE49-F238E27FC236}">
-                <a16:creationId xmlns:a16="http://schemas.microsoft.com/office/drawing/2014/main" id="{8E8059D3-3DDC-4A5D-A0A2-2C7CF7F2D860}"/>
+                <a16:creationId xmlns:a16="http://schemas.microsoft.com/office/drawing/2014/main" id="{2A27C84F-93ED-439A-BF83-DB8FFBAE887B}"/>
               </a:ext>
             </a:extLst>
           </p:cNvPr>
@@ -6415,173 +7413,123 @@
           <a:p>
             <a:r>
               <a:rPr lang="en-US" altLang="zh-CN" dirty="0"/>
-              <a:t>Change in sampling parameters</a:t>
+              <a:t>Getting rid of aliasing</a:t>
             </a:r>
             <a:endParaRPr lang="zh-CN" altLang="en-US" dirty="0"/>
           </a:p>
         </p:txBody>
       </p:sp>
-      <p:sp>
-        <p:nvSpPr>
-          <p:cNvPr id="3" name="内容占位符 2">
-            <a:extLst>
-              <a:ext uri="{FF2B5EF4-FFF2-40B4-BE49-F238E27FC236}">
-                <a16:creationId xmlns:a16="http://schemas.microsoft.com/office/drawing/2014/main" id="{F5A12E00-EA55-4DD6-8AF0-B9491863DB19}"/>
-              </a:ext>
-            </a:extLst>
-          </p:cNvPr>
-          <p:cNvSpPr>
-            <a:spLocks noGrp="1"/>
-          </p:cNvSpPr>
-          <p:nvPr>
-            <p:ph idx="1"/>
-          </p:nvPr>
-        </p:nvSpPr>
-        <p:spPr/>
-        <p:txBody>
-          <a:bodyPr/>
+      <p:pic>
+        <p:nvPicPr>
+          <p:cNvPr id="4" name="图片 3">
+            <a:extLst>
+              <a:ext uri="{FF2B5EF4-FFF2-40B4-BE49-F238E27FC236}">
+                <a16:creationId xmlns:a16="http://schemas.microsoft.com/office/drawing/2014/main" id="{FAA3956F-7077-4A1E-918D-765B5FAE1509}"/>
+              </a:ext>
+            </a:extLst>
+          </p:cNvPr>
+          <p:cNvPicPr>
+            <a:picLocks noChangeAspect="1"/>
+          </p:cNvPicPr>
+          <p:nvPr/>
+        </p:nvPicPr>
+        <p:blipFill>
+          <a:blip r:embed="rId3">
+            <a:extLst>
+              <a:ext uri="{28A0092B-C50C-407E-A947-70E740481C1C}">
+                <a14:useLocalDpi xmlns:a14="http://schemas.microsoft.com/office/drawing/2010/main" val="0"/>
+              </a:ext>
+            </a:extLst>
+          </a:blip>
+          <a:srcRect/>
+          <a:stretch/>
+        </p:blipFill>
+        <p:spPr>
+          <a:xfrm>
+            <a:off x="1210237" y="2331720"/>
+            <a:ext cx="10972795" cy="2194558"/>
+          </a:xfrm>
+          <a:prstGeom prst="rect">
+            <a:avLst/>
+          </a:prstGeom>
+        </p:spPr>
+      </p:pic>
+      <p:sp>
+        <p:nvSpPr>
+          <p:cNvPr id="5" name="文本框 4">
+            <a:extLst>
+              <a:ext uri="{FF2B5EF4-FFF2-40B4-BE49-F238E27FC236}">
+                <a16:creationId xmlns:a16="http://schemas.microsoft.com/office/drawing/2014/main" id="{93E6867C-441A-441C-83B5-E16FE2672A67}"/>
+              </a:ext>
+            </a:extLst>
+          </p:cNvPr>
+          <p:cNvSpPr txBox="1"/>
+          <p:nvPr/>
+        </p:nvSpPr>
+        <p:spPr>
+          <a:xfrm>
+            <a:off x="271590" y="2510133"/>
+            <a:ext cx="2695728" cy="3416320"/>
+          </a:xfrm>
+          <a:prstGeom prst="rect">
+            <a:avLst/>
+          </a:prstGeom>
+          <a:noFill/>
+        </p:spPr>
+        <p:txBody>
+          <a:bodyPr wrap="square" rtlCol="0">
+            <a:spAutoFit/>
+          </a:bodyPr>
           <a:lstStyle/>
           <a:p>
             <a:r>
               <a:rPr lang="en-US" altLang="zh-CN" dirty="0"/>
-              <a:t>For getting rid of the aliasing, my first attempt is to change the sampling resolutions</a:t>
-            </a:r>
-          </a:p>
-          <a:p>
+              <a:t>Increase </a:t>
+            </a:r>
+            <a:r>
+              <a:rPr lang="en-US" altLang="zh-CN" dirty="0" err="1"/>
+              <a:t>xres</a:t>
+            </a:r>
             <a:r>
               <a:rPr lang="en-US" altLang="zh-CN" dirty="0"/>
-              <a:t>Change log:</a:t>
-            </a:r>
-          </a:p>
-          <a:p>
-            <a:pPr marL="457200" lvl="1" indent="0">
-              <a:buNone/>
-            </a:pPr>
+              <a:t> at CRL1 to see effect on aliasing</a:t>
+            </a:r>
+          </a:p>
+          <a:p>
+            <a:endParaRPr lang="en-US" altLang="zh-CN" dirty="0"/>
+          </a:p>
+          <a:p>
             <a:r>
               <a:rPr lang="en-US" altLang="zh-CN" dirty="0"/>
-              <a:t>1. </a:t>
-            </a:r>
-            <a:r>
-              <a:rPr lang="en-US" altLang="zh-CN" strike="sngStrike" dirty="0"/>
-              <a:t>400</a:t>
-            </a:r>
+              <a:t>256 x 256 x 1600</a:t>
+            </a:r>
+          </a:p>
+          <a:p>
+            <a:endParaRPr lang="en-US" altLang="zh-CN" dirty="0"/>
+          </a:p>
+          <a:p>
+            <a:endParaRPr lang="en-US" altLang="zh-CN" dirty="0"/>
+          </a:p>
+          <a:p>
+            <a:endParaRPr lang="en-US" altLang="zh-CN" dirty="0"/>
+          </a:p>
+          <a:p>
+            <a:endParaRPr lang="en-US" altLang="zh-CN" dirty="0"/>
+          </a:p>
+          <a:p>
+            <a:endParaRPr lang="en-US" altLang="zh-CN" dirty="0"/>
+          </a:p>
+          <a:p>
+            <a:endParaRPr lang="en-US" altLang="zh-CN" dirty="0"/>
+          </a:p>
+          <a:p>
+            <a:endParaRPr lang="en-US" altLang="zh-CN" dirty="0"/>
+          </a:p>
+          <a:p>
             <a:r>
               <a:rPr lang="en-US" altLang="zh-CN" dirty="0"/>
-              <a:t> </a:t>
-            </a:r>
-            <a:r>
-              <a:rPr lang="en-US" altLang="zh-CN" dirty="0">
-                <a:solidFill>
-                  <a:srgbClr val="FF0000"/>
-                </a:solidFill>
-              </a:rPr>
-              <a:t>100 </a:t>
-            </a:r>
-            <a:r>
-              <a:rPr lang="en-US" altLang="zh-CN" dirty="0"/>
-              <a:t>fs incident pulse</a:t>
-            </a:r>
-          </a:p>
-          <a:p>
-            <a:pPr marL="457200" lvl="1" indent="0">
-              <a:buNone/>
-            </a:pPr>
-            <a:r>
-              <a:rPr lang="en-US" altLang="zh-CN" dirty="0"/>
-              <a:t>2. </a:t>
-            </a:r>
-            <a:r>
-              <a:rPr lang="en-US" altLang="zh-CN" strike="sngStrike" dirty="0"/>
-              <a:t>1280</a:t>
-            </a:r>
-            <a:r>
-              <a:rPr lang="en-US" altLang="zh-CN" dirty="0"/>
-              <a:t> </a:t>
-            </a:r>
-            <a:r>
-              <a:rPr lang="en-US" altLang="zh-CN" dirty="0">
-                <a:solidFill>
-                  <a:srgbClr val="FF0000"/>
-                </a:solidFill>
-              </a:rPr>
-              <a:t>5120</a:t>
-            </a:r>
-            <a:r>
-              <a:rPr lang="en-US" altLang="zh-CN" dirty="0"/>
-              <a:t> x 256 x 1600 pts at CRL1</a:t>
-            </a:r>
-          </a:p>
-          <a:p>
-            <a:pPr marL="457200" lvl="1" indent="0">
-              <a:buNone/>
-            </a:pPr>
-            <a:r>
-              <a:rPr lang="en-US" altLang="zh-CN" dirty="0"/>
-              <a:t>3. 256 x 256 x </a:t>
-            </a:r>
-            <a:r>
-              <a:rPr lang="en-US" altLang="zh-CN" strike="sngStrike" dirty="0"/>
-              <a:t>1600</a:t>
-            </a:r>
-            <a:r>
-              <a:rPr lang="en-US" altLang="zh-CN" dirty="0"/>
-              <a:t> </a:t>
-            </a:r>
-            <a:r>
-              <a:rPr lang="en-US" altLang="zh-CN" dirty="0">
-                <a:solidFill>
-                  <a:srgbClr val="FF0000"/>
-                </a:solidFill>
-              </a:rPr>
-              <a:t>3200</a:t>
-            </a:r>
-            <a:r>
-              <a:rPr lang="en-US" altLang="zh-CN" dirty="0"/>
-              <a:t> pts at HHLM output (for 100fs incident beam)</a:t>
-            </a:r>
-          </a:p>
-          <a:p>
-            <a:pPr marL="0" indent="0">
-              <a:buNone/>
-            </a:pPr>
-            <a:r>
-              <a:rPr lang="en-US" altLang="zh-CN" dirty="0"/>
-              <a:t>To do:</a:t>
-            </a:r>
-          </a:p>
-          <a:p>
-            <a:pPr marL="457200" lvl="1" indent="0">
-              <a:buNone/>
-            </a:pPr>
-            <a:r>
-              <a:rPr lang="en-US" altLang="zh-CN" strike="sngStrike" dirty="0"/>
-              <a:t>5120</a:t>
-            </a:r>
-            <a:r>
-              <a:rPr lang="en-US" altLang="zh-CN" dirty="0"/>
-              <a:t> </a:t>
-            </a:r>
-            <a:r>
-              <a:rPr lang="en-US" altLang="zh-CN" dirty="0">
-                <a:solidFill>
-                  <a:srgbClr val="FF0000"/>
-                </a:solidFill>
-              </a:rPr>
-              <a:t>10240</a:t>
-            </a:r>
-            <a:r>
-              <a:rPr lang="en-US" altLang="zh-CN" dirty="0"/>
-              <a:t> x 256 x 3200 pts at CRL1</a:t>
-            </a:r>
-          </a:p>
-          <a:p>
-            <a:pPr marL="457200" lvl="1" indent="0">
-              <a:buNone/>
-            </a:pPr>
-            <a:endParaRPr lang="en-US" altLang="zh-CN" dirty="0"/>
-          </a:p>
-          <a:p>
-            <a:pPr lvl="1"/>
+              <a:t>512 x 256 x 1600</a:t>
+            </a:r>
             <a:endParaRPr lang="zh-CN" altLang="en-US" dirty="0"/>
           </a:p>
         </p:txBody>
@@ -6589,7 +7537,7 @@
     </p:spTree>
     <p:extLst>
       <p:ext uri="{BB962C8B-B14F-4D97-AF65-F5344CB8AC3E}">
-        <p14:creationId xmlns:p14="http://schemas.microsoft.com/office/powerpoint/2010/main" val="4063769136"/>
+        <p14:creationId xmlns:p14="http://schemas.microsoft.com/office/powerpoint/2010/main" val="4002229400"/>
       </p:ext>
     </p:extLst>
   </p:cSld>

</xml_diff>